<commit_message>
update according to changes of ckb-debugger
</commit_message>
<xml_diff>
--- a/slides/presentation.pptx
+++ b/slides/presentation.pptx
@@ -24,39 +24,38 @@
     <p:sldId id="290" r:id="rId17"/>
     <p:sldId id="284" r:id="rId18"/>
     <p:sldId id="287" r:id="rId19"/>
-    <p:sldId id="288" r:id="rId20"/>
-    <p:sldId id="267" r:id="rId21"/>
+    <p:sldId id="267" r:id="rId20"/>
   </p:sldIdLst>
   <p:sldSz cx="9144000" cy="5143500"/>
   <p:notesSz cx="6858000" cy="9144000"/>
   <p:embeddedFontLst>
     <p:embeddedFont>
       <p:font typeface="Montserrat" charset="0"/>
-      <p:regular r:id="rId25"/>
-      <p:bold r:id="rId26"/>
-      <p:italic r:id="rId27"/>
-      <p:boldItalic r:id="rId28"/>
+      <p:regular r:id="rId24"/>
+      <p:bold r:id="rId25"/>
+      <p:italic r:id="rId26"/>
+      <p:boldItalic r:id="rId27"/>
     </p:embeddedFont>
     <p:embeddedFont>
       <p:font typeface="Archivo Medium" charset="0"/>
-      <p:regular r:id="rId29"/>
-      <p:bold r:id="rId30"/>
-      <p:italic r:id="rId31"/>
-      <p:boldItalic r:id="rId32"/>
+      <p:regular r:id="rId28"/>
+      <p:bold r:id="rId29"/>
+      <p:italic r:id="rId30"/>
+      <p:boldItalic r:id="rId31"/>
     </p:embeddedFont>
     <p:embeddedFont>
       <p:font typeface="Montserrat Medium" charset="0"/>
-      <p:regular r:id="rId33"/>
-      <p:bold r:id="rId34"/>
-      <p:italic r:id="rId35"/>
-      <p:boldItalic r:id="rId36"/>
+      <p:regular r:id="rId32"/>
+      <p:bold r:id="rId33"/>
+      <p:italic r:id="rId34"/>
+      <p:boldItalic r:id="rId35"/>
     </p:embeddedFont>
     <p:embeddedFont>
       <p:font typeface="Archivo SemiBold" charset="0"/>
-      <p:regular r:id="rId37"/>
-      <p:bold r:id="rId38"/>
-      <p:italic r:id="rId39"/>
-      <p:boldItalic r:id="rId40"/>
+      <p:regular r:id="rId36"/>
+      <p:bold r:id="rId37"/>
+      <p:italic r:id="rId38"/>
+      <p:boldItalic r:id="rId39"/>
     </p:embeddedFont>
   </p:embeddedFontLst>
   <p:defaultTextStyle>
@@ -1522,105 +1521,6 @@
 </file>
 
 <file path=ppt/notesSlides/notesSlide17.xml><?xml version="1.0" encoding="utf-8"?>
-<p:notes xmlns:a="http://schemas.openxmlformats.org/drawingml/2006/main" xmlns:r="http://schemas.openxmlformats.org/officeDocument/2006/relationships" xmlns:p="http://schemas.openxmlformats.org/presentationml/2006/main" showMasterPhAnim="0" showMasterSp="0">
-  <p:cSld>
-    <p:spTree>
-      <p:nvGrpSpPr>
-        <p:cNvPr id="46" name="Shape 46"/>
-        <p:cNvGrpSpPr/>
-        <p:nvPr/>
-      </p:nvGrpSpPr>
-      <p:grpSpPr>
-        <a:xfrm>
-          <a:off x="0" y="0"/>
-          <a:ext cx="0" cy="0"/>
-          <a:chOff x="0" y="0"/>
-          <a:chExt cx="0" cy="0"/>
-        </a:xfrm>
-      </p:grpSpPr>
-      <p:sp>
-        <p:nvSpPr>
-          <p:cNvPr id="47" name="Google Shape;47;g80d73bad10_0_27:notes"/>
-          <p:cNvSpPr/>
-          <p:nvPr>
-            <p:ph type="sldImg" idx="2"/>
-          </p:nvPr>
-        </p:nvSpPr>
-        <p:spPr>
-          <a:xfrm>
-            <a:off x="381300" y="685800"/>
-            <a:ext cx="6096000" cy="3429000"/>
-          </a:xfrm>
-          <a:custGeom>
-            <a:avLst/>
-            <a:gdLst/>
-            <a:ahLst/>
-            <a:cxnLst/>
-            <a:rect l="l" t="t" r="r" b="b"/>
-            <a:pathLst>
-              <a:path w="120000" h="120000" extrusionOk="0">
-                <a:moveTo>
-                  <a:pt x="0" y="0"/>
-                </a:moveTo>
-                <a:lnTo>
-                  <a:pt x="120000" y="0"/>
-                </a:lnTo>
-                <a:lnTo>
-                  <a:pt x="120000" y="120000"/>
-                </a:lnTo>
-                <a:lnTo>
-                  <a:pt x="0" y="120000"/>
-                </a:lnTo>
-                <a:close/>
-              </a:path>
-            </a:pathLst>
-          </a:custGeom>
-        </p:spPr>
-      </p:sp>
-      <p:sp>
-        <p:nvSpPr>
-          <p:cNvPr id="48" name="Google Shape;48;g80d73bad10_0_27:notes"/>
-          <p:cNvSpPr txBox="1"/>
-          <p:nvPr>
-            <p:ph type="body" idx="1"/>
-          </p:nvPr>
-        </p:nvSpPr>
-        <p:spPr>
-          <a:xfrm>
-            <a:off x="685800" y="4343400"/>
-            <a:ext cx="5486400" cy="4114800"/>
-          </a:xfrm>
-          <a:prstGeom prst="rect">
-            <a:avLst/>
-          </a:prstGeom>
-        </p:spPr>
-        <p:txBody>
-          <a:bodyPr spcFirstLastPara="1" wrap="square" lIns="91425" tIns="91425" rIns="91425" bIns="91425" anchor="t" anchorCtr="0">
-            <a:noAutofit/>
-          </a:bodyPr>
-          <a:lstStyle/>
-          <a:p>
-            <a:pPr marL="0" lvl="0" indent="0" algn="l" rtl="0">
-              <a:spcBef>
-                <a:spcPts val="0"/>
-              </a:spcBef>
-              <a:spcAft>
-                <a:spcPts val="0"/>
-              </a:spcAft>
-              <a:buNone/>
-            </a:pPr>
-          </a:p>
-        </p:txBody>
-      </p:sp>
-    </p:spTree>
-  </p:cSld>
-  <p:clrMapOvr>
-    <a:masterClrMapping/>
-  </p:clrMapOvr>
-</p:notes>
-</file>
-
-<file path=ppt/notesSlides/notesSlide18.xml><?xml version="1.0" encoding="utf-8"?>
 <p:notes xmlns:a="http://schemas.openxmlformats.org/drawingml/2006/main" xmlns:r="http://schemas.openxmlformats.org/officeDocument/2006/relationships" xmlns:p="http://schemas.openxmlformats.org/presentationml/2006/main" showMasterPhAnim="0" showMasterSp="0">
   <p:cSld>
     <p:spTree>
@@ -4507,7 +4407,7 @@
         <p:spPr>
           <a:xfrm>
             <a:off x="821690" y="2271395"/>
-            <a:ext cx="4234815" cy="1599565"/>
+            <a:ext cx="4234815" cy="1814830"/>
           </a:xfrm>
           <a:prstGeom prst="rect">
             <a:avLst/>
@@ -4549,7 +4449,7 @@
             </a:pPr>
             <a:r>
               <a:rPr lang="en-US"/>
-              <a:t>ckb-debugger --simple-binary build/panic</a:t>
+              <a:t>ckb-debugger --pprof=/dev/null --simple-binary  build/panic</a:t>
             </a:r>
             <a:endParaRPr lang="en-US"/>
           </a:p>
@@ -5088,12 +4988,12 @@
             </a:r>
             <a:r>
               <a:rPr lang="en-US">
-                <a:hlinkClick r:id="rId1" tooltip="" action="ppaction://hlinkfile"/>
+                <a:hlinkClick r:id="rId1" action="ppaction://hlinkfile"/>
               </a:rPr>
               <a:t>inferno-flamegraph</a:t>
             </a:r>
             <a:endParaRPr lang="en-US">
-              <a:hlinkClick r:id="rId1" tooltip="" action="ppaction://hlinkfile"/>
+              <a:hlinkClick r:id="rId1" action="ppaction://hlinkfile"/>
             </a:endParaRPr>
           </a:p>
           <a:p>
@@ -5102,7 +5002,7 @@
               <a:buChar char="•"/>
             </a:pPr>
             <a:endParaRPr lang="en-US">
-              <a:hlinkClick r:id="rId1" tooltip="" action="ppaction://hlinkfile"/>
+              <a:hlinkClick r:id="rId1" action="ppaction://hlinkfile"/>
             </a:endParaRPr>
           </a:p>
           <a:p>
@@ -5111,7 +5011,7 @@
               <a:buChar char="•"/>
             </a:pPr>
             <a:endParaRPr lang="en-US">
-              <a:hlinkClick r:id="rId1" tooltip="" action="ppaction://hlinkfile"/>
+              <a:hlinkClick r:id="rId1" action="ppaction://hlinkfile"/>
             </a:endParaRPr>
           </a:p>
           <a:p>
@@ -5120,7 +5020,7 @@
               <a:buChar char="•"/>
             </a:pPr>
             <a:endParaRPr lang="en-US">
-              <a:hlinkClick r:id="rId1" tooltip="" action="ppaction://hlinkfile"/>
+              <a:hlinkClick r:id="rId1" action="ppaction://hlinkfile"/>
             </a:endParaRPr>
           </a:p>
           <a:p>
@@ -5500,7 +5400,7 @@
         <p:spPr>
           <a:xfrm>
             <a:off x="721995" y="599758"/>
-            <a:ext cx="1855470" cy="430530"/>
+            <a:ext cx="6017895" cy="430530"/>
           </a:xfrm>
           <a:prstGeom prst="rect">
             <a:avLst/>
@@ -5535,7 +5435,7 @@
                 <a:cs typeface="Noto Sans SC Black" panose="020B0A00000000000000" charset="-122"/>
                 <a:sym typeface="Montserrat" panose="00000300000000000000"/>
               </a:rPr>
-              <a:t>TODO List</a:t>
+              <a:t>Limitation/Future Enhancedments</a:t>
             </a:r>
             <a:endParaRPr lang="en-US" sz="2800" kern="100" spc="100">
               <a:solidFill>
@@ -5603,7 +5503,7 @@
         </p:nvSpPr>
         <p:spPr>
           <a:xfrm>
-            <a:off x="721995" y="1609725"/>
+            <a:off x="789305" y="2844800"/>
             <a:ext cx="6633210" cy="737235"/>
           </a:xfrm>
           <a:prstGeom prst="rect">
@@ -5622,13 +5522,13 @@
             </a:pPr>
             <a:r>
               <a:rPr lang="en-US"/>
-              <a:t>Build a tool to generate/modify “</a:t>
+              <a:t>Build a tool to generate/modify </a:t>
             </a:r>
             <a:r>
               <a:rPr lang="en-US">
                 <a:sym typeface="+mn-ea"/>
               </a:rPr>
-              <a:t>mocked transaction file”</a:t>
+              <a:t>mocked transaction files</a:t>
             </a:r>
             <a:endParaRPr lang="en-US">
               <a:sym typeface="+mn-ea"/>
@@ -5652,6 +5552,35 @@
             <a:endParaRPr lang="en-US"/>
           </a:p>
           <a:p>
+            <a:endParaRPr lang="en-US"/>
+          </a:p>
+        </p:txBody>
+      </p:sp>
+      <p:sp>
+        <p:nvSpPr>
+          <p:cNvPr id="2" name="Text Box 1"/>
+          <p:cNvSpPr txBox="1"/>
+          <p:nvPr/>
+        </p:nvSpPr>
+        <p:spPr>
+          <a:xfrm>
+            <a:off x="824865" y="1609725"/>
+            <a:ext cx="5213350" cy="521970"/>
+          </a:xfrm>
+          <a:prstGeom prst="rect">
+            <a:avLst/>
+          </a:prstGeom>
+          <a:noFill/>
+        </p:spPr>
+        <p:txBody>
+          <a:bodyPr wrap="square" rtlCol="0">
+            <a:spAutoFit/>
+          </a:bodyPr>
+          <a:p>
+            <a:r>
+              <a:rPr lang="en-US"/>
+              <a:t>Limitation: Difficult to generate altered mocked transaction files by any tool.</a:t>
+            </a:r>
             <a:endParaRPr lang="en-US"/>
           </a:p>
         </p:txBody>
@@ -5665,178 +5594,6 @@
 </file>
 
 <file path=ppt/slides/slide17.xml><?xml version="1.0" encoding="utf-8"?>
-<p:sld xmlns:a="http://schemas.openxmlformats.org/drawingml/2006/main" xmlns:r="http://schemas.openxmlformats.org/officeDocument/2006/relationships" xmlns:p="http://schemas.openxmlformats.org/presentationml/2006/main">
-  <p:cSld>
-    <p:spTree>
-      <p:nvGrpSpPr>
-        <p:cNvPr id="49" name="Shape 49"/>
-        <p:cNvGrpSpPr/>
-        <p:nvPr/>
-      </p:nvGrpSpPr>
-      <p:grpSpPr>
-        <a:xfrm>
-          <a:off x="0" y="0"/>
-          <a:ext cx="0" cy="0"/>
-          <a:chOff x="0" y="0"/>
-          <a:chExt cx="0" cy="0"/>
-        </a:xfrm>
-      </p:grpSpPr>
-      <p:sp>
-        <p:nvSpPr>
-          <p:cNvPr id="40" name="Google Shape;40;p9"/>
-          <p:cNvSpPr txBox="1"/>
-          <p:nvPr/>
-        </p:nvSpPr>
-        <p:spPr>
-          <a:xfrm>
-            <a:off x="721995" y="599758"/>
-            <a:ext cx="1685925" cy="430530"/>
-          </a:xfrm>
-          <a:prstGeom prst="rect">
-            <a:avLst/>
-          </a:prstGeom>
-          <a:noFill/>
-          <a:ln>
-            <a:noFill/>
-          </a:ln>
-        </p:spPr>
-        <p:txBody>
-          <a:bodyPr spcFirstLastPara="1" wrap="none" lIns="0" tIns="0" rIns="0" bIns="0" anchor="ctr" anchorCtr="0">
-            <a:spAutoFit/>
-          </a:bodyPr>
-          <a:p>
-            <a:pPr marL="0" lvl="0" indent="0" algn="l" rtl="0" fontAlgn="t">
-              <a:spcBef>
-                <a:spcPts val="0"/>
-              </a:spcBef>
-              <a:spcAft>
-                <a:spcPts val="0"/>
-              </a:spcAft>
-              <a:buNone/>
-            </a:pPr>
-            <a:r>
-              <a:rPr lang="en-US" sz="2800" kern="100" spc="100">
-                <a:solidFill>
-                  <a:srgbClr val="EF190F"/>
-                </a:solidFill>
-                <a:uFillTx/>
-                <a:latin typeface="Noto Sans SC Black" panose="020B0A00000000000000" charset="-122"/>
-                <a:ea typeface="Montserrat" panose="00000300000000000000"/>
-                <a:cs typeface="Noto Sans SC Black" panose="020B0A00000000000000" charset="-122"/>
-                <a:sym typeface="Montserrat" panose="00000300000000000000"/>
-              </a:rPr>
-              <a:t>Title here</a:t>
-            </a:r>
-            <a:endParaRPr lang="en-US" sz="2800" kern="100" spc="100">
-              <a:solidFill>
-                <a:srgbClr val="EF190F"/>
-              </a:solidFill>
-              <a:uFillTx/>
-              <a:latin typeface="Noto Sans SC Black" panose="020B0A00000000000000" charset="-122"/>
-              <a:ea typeface="Montserrat" panose="00000300000000000000"/>
-              <a:cs typeface="Noto Sans SC Black" panose="020B0A00000000000000" charset="-122"/>
-              <a:sym typeface="Montserrat" panose="00000300000000000000"/>
-            </a:endParaRPr>
-          </a:p>
-        </p:txBody>
-      </p:sp>
-      <p:sp>
-        <p:nvSpPr>
-          <p:cNvPr id="39" name="Google Shape;39;p9"/>
-          <p:cNvSpPr txBox="1"/>
-          <p:nvPr/>
-        </p:nvSpPr>
-        <p:spPr>
-          <a:xfrm>
-            <a:off x="8430975" y="4561225"/>
-            <a:ext cx="630900" cy="521700"/>
-          </a:xfrm>
-          <a:prstGeom prst="rect">
-            <a:avLst/>
-          </a:prstGeom>
-          <a:noFill/>
-          <a:ln>
-            <a:noFill/>
-          </a:ln>
-        </p:spPr>
-        <p:txBody>
-          <a:bodyPr spcFirstLastPara="1" wrap="square" lIns="91425" tIns="91425" rIns="91425" bIns="91425" anchor="t" anchorCtr="0">
-            <a:noAutofit/>
-          </a:bodyPr>
-          <a:p>
-            <a:pPr marL="0" lvl="0" indent="0" algn="l" rtl="0">
-              <a:spcBef>
-                <a:spcPts val="0"/>
-              </a:spcBef>
-              <a:spcAft>
-                <a:spcPts val="0"/>
-              </a:spcAft>
-              <a:buNone/>
-            </a:pPr>
-            <a:endParaRPr lang="en-US" sz="2700" b="1">
-              <a:solidFill>
-                <a:srgbClr val="B7B7B7"/>
-              </a:solidFill>
-              <a:latin typeface="Montserrat Bold" panose="00000300000000000000" charset="0"/>
-              <a:ea typeface="Noto Sans SC Bold" panose="020B0800000000000000" charset="-122"/>
-              <a:cs typeface="Montserrat Bold" panose="00000300000000000000" charset="0"/>
-              <a:sym typeface="Montserrat" panose="00000300000000000000"/>
-            </a:endParaRPr>
-          </a:p>
-        </p:txBody>
-      </p:sp>
-      <p:sp>
-        <p:nvSpPr>
-          <p:cNvPr id="1" name="Text Box 0"/>
-          <p:cNvSpPr txBox="1"/>
-          <p:nvPr/>
-        </p:nvSpPr>
-        <p:spPr>
-          <a:xfrm>
-            <a:off x="721995" y="1609725"/>
-            <a:ext cx="6633210" cy="737235"/>
-          </a:xfrm>
-          <a:prstGeom prst="rect">
-            <a:avLst/>
-          </a:prstGeom>
-          <a:noFill/>
-        </p:spPr>
-        <p:txBody>
-          <a:bodyPr wrap="square" rtlCol="0">
-            <a:spAutoFit/>
-          </a:bodyPr>
-          <a:p>
-            <a:pPr marL="285750" indent="-285750">
-              <a:buFont typeface="Arial" panose="020B0604020202090204" pitchFamily="34" charset="0"/>
-              <a:buChar char="•"/>
-            </a:pPr>
-            <a:r>
-              <a:rPr lang="en-US"/>
-              <a:t>Content here</a:t>
-            </a:r>
-            <a:endParaRPr lang="en-US"/>
-          </a:p>
-          <a:p>
-            <a:pPr marL="285750" indent="-285750">
-              <a:buFont typeface="Arial" panose="020B0604020202090204" pitchFamily="34" charset="0"/>
-              <a:buChar char="•"/>
-            </a:pPr>
-            <a:endParaRPr lang="en-US"/>
-          </a:p>
-          <a:p>
-            <a:endParaRPr lang="en-US"/>
-          </a:p>
-        </p:txBody>
-      </p:sp>
-    </p:spTree>
-  </p:cSld>
-  <p:clrMapOvr>
-    <a:masterClrMapping/>
-  </p:clrMapOvr>
-</p:sld>
-</file>
-
-<file path=ppt/slides/slide18.xml><?xml version="1.0" encoding="utf-8"?>
 <p:sld xmlns:a="http://schemas.openxmlformats.org/drawingml/2006/main" xmlns:r="http://schemas.openxmlformats.org/officeDocument/2006/relationships" xmlns:p="http://schemas.openxmlformats.org/presentationml/2006/main">
   <p:cSld>
     <p:spTree>
@@ -6708,6 +6465,10 @@
             <a:spAutoFit/>
           </a:bodyPr>
           <a:p>
+            <a:pPr marL="285750" indent="-285750">
+              <a:buFont typeface="Arial" panose="020B0604020202090204" pitchFamily="34" charset="0"/>
+              <a:buChar char="•"/>
+            </a:pPr>
             <a:r>
               <a:rPr lang="en-US"/>
               <a:t>Download  </a:t>
@@ -6723,7 +6484,10 @@
             </a:endParaRPr>
           </a:p>
           <a:p>
-            <a:pPr algn="just"/>
+            <a:pPr marL="285750" indent="-285750" algn="just">
+              <a:buFont typeface="Arial" panose="020B0604020202090204" pitchFamily="34" charset="0"/>
+              <a:buChar char="•"/>
+            </a:pPr>
             <a:r>
               <a:rPr lang="en-US"/>
               <a:t>Install </a:t>
@@ -7004,7 +6768,7 @@
           <a:p>
             <a:r>
               <a:rPr lang="en-US"/>
-              <a:t>--cell-index: 0,1,2...</a:t>
+              <a:t>--cell-index: 0,1, 2...</a:t>
             </a:r>
             <a:endParaRPr lang="en-US"/>
           </a:p>
@@ -7177,6 +6941,35 @@
           </a:prstGeom>
         </p:spPr>
       </p:pic>
+      <p:sp>
+        <p:nvSpPr>
+          <p:cNvPr id="1" name="Text Box 0"/>
+          <p:cNvSpPr txBox="1"/>
+          <p:nvPr/>
+        </p:nvSpPr>
+        <p:spPr>
+          <a:xfrm>
+            <a:off x="4930775" y="1934210"/>
+            <a:ext cx="2875915" cy="737235"/>
+          </a:xfrm>
+          <a:prstGeom prst="rect">
+            <a:avLst/>
+          </a:prstGeom>
+          <a:noFill/>
+        </p:spPr>
+        <p:txBody>
+          <a:bodyPr wrap="square" rtlCol="0">
+            <a:spAutoFit/>
+          </a:bodyPr>
+          <a:p>
+            <a:r>
+              <a:rPr lang="en-US"/>
+              <a:t>This is a very simple transaction with 1 input and 2 outputs using secp256k1 signature</a:t>
+            </a:r>
+            <a:endParaRPr lang="en-US"/>
+          </a:p>
+        </p:txBody>
+      </p:sp>
     </p:spTree>
   </p:cSld>
   <p:clrMapOvr>
@@ -7357,7 +7150,7 @@
         </p:nvSpPr>
         <p:spPr>
           <a:xfrm>
-            <a:off x="349250" y="1812290"/>
+            <a:off x="349250" y="1812925"/>
             <a:ext cx="2306955" cy="1597025"/>
           </a:xfrm>
           <a:prstGeom prst="snip2DiagRect">
@@ -7422,21 +7215,121 @@
           </a:p>
         </p:txBody>
       </p:sp>
+      <p:sp>
+        <p:nvSpPr>
+          <p:cNvPr id="5" name="Text Box 4"/>
+          <p:cNvSpPr txBox="1"/>
+          <p:nvPr/>
+        </p:nvSpPr>
+        <p:spPr>
+          <a:xfrm>
+            <a:off x="4681220" y="3409315"/>
+            <a:ext cx="2407920" cy="306705"/>
+          </a:xfrm>
+          <a:prstGeom prst="rect">
+            <a:avLst/>
+          </a:prstGeom>
+          <a:noFill/>
+          <a:ln>
+            <a:solidFill>
+              <a:schemeClr val="accent1"/>
+            </a:solidFill>
+          </a:ln>
+        </p:spPr>
+        <p:txBody>
+          <a:bodyPr wrap="square" rtlCol="0">
+            <a:spAutoFit/>
+          </a:bodyPr>
+          <a:p>
+            <a:r>
+              <a:rPr lang="en-US"/>
+              <a:t>listening on 127.0.0.1:9999</a:t>
+            </a:r>
+            <a:endParaRPr lang="en-US"/>
+          </a:p>
+        </p:txBody>
+      </p:sp>
+      <p:sp>
+        <p:nvSpPr>
+          <p:cNvPr id="6" name="Text Box 5"/>
+          <p:cNvSpPr txBox="1"/>
+          <p:nvPr/>
+        </p:nvSpPr>
+        <p:spPr>
+          <a:xfrm>
+            <a:off x="349250" y="4039235"/>
+            <a:ext cx="4639310" cy="521970"/>
+          </a:xfrm>
+          <a:prstGeom prst="rect">
+            <a:avLst/>
+          </a:prstGeom>
+          <a:noFill/>
+        </p:spPr>
+        <p:txBody>
+          <a:bodyPr wrap="square" rtlCol="0">
+            <a:spAutoFit/>
+          </a:bodyPr>
+          <a:p>
+            <a:r>
+              <a:rPr lang="en-US"/>
+              <a:t>It's not very easy to build </a:t>
+            </a:r>
+            <a:r>
+              <a:rPr lang="en-US">
+                <a:hlinkClick r:id="rId1" action="ppaction://hlinkfile"/>
+              </a:rPr>
+              <a:t>gdb in gcc toolchain </a:t>
+            </a:r>
+            <a:r>
+              <a:rPr lang="en-US"/>
+              <a:t>So we use gdb in docker instead.</a:t>
+            </a:r>
+            <a:endParaRPr lang="en-US"/>
+          </a:p>
+        </p:txBody>
+      </p:sp>
+      <p:sp>
+        <p:nvSpPr>
+          <p:cNvPr id="7" name="Text Box 6"/>
+          <p:cNvSpPr txBox="1"/>
+          <p:nvPr/>
+        </p:nvSpPr>
+        <p:spPr>
+          <a:xfrm>
+            <a:off x="2889250" y="2188210"/>
+            <a:ext cx="2582545" cy="306705"/>
+          </a:xfrm>
+          <a:prstGeom prst="rect">
+            <a:avLst/>
+          </a:prstGeom>
+          <a:noFill/>
+        </p:spPr>
+        <p:txBody>
+          <a:bodyPr wrap="square" rtlCol="0">
+            <a:spAutoFit/>
+          </a:bodyPr>
+          <a:p>
+            <a:r>
+              <a:rPr lang="en-US"/>
+              <a:t>GDB Remote Seriel Protocol</a:t>
+            </a:r>
+            <a:endParaRPr lang="en-US"/>
+          </a:p>
+        </p:txBody>
+      </p:sp>
       <p:cxnSp>
         <p:nvCxnSpPr>
-          <p:cNvPr id="4" name="Elbow Connector 3"/>
+          <p:cNvPr id="8" name="Straight Connector 7"/>
           <p:cNvCxnSpPr/>
           <p:nvPr/>
         </p:nvCxnSpPr>
         <p:spPr>
-          <a:xfrm>
-            <a:off x="2656205" y="2607945"/>
-            <a:ext cx="3445510" cy="4445"/>
-          </a:xfrm>
-          <a:prstGeom prst="bentConnector3">
-            <a:avLst>
-              <a:gd name="adj1" fmla="val 50000"/>
-            </a:avLst>
+          <a:xfrm flipV="1">
+            <a:off x="2656205" y="2611120"/>
+            <a:ext cx="3445510" cy="635"/>
+          </a:xfrm>
+          <a:prstGeom prst="line">
+            <a:avLst/>
           </a:prstGeom>
           <a:ln w="28575" cmpd="sng">
             <a:solidFill>
@@ -7462,108 +7355,6 @@
           </a:fontRef>
         </p:style>
       </p:cxnSp>
-      <p:sp>
-        <p:nvSpPr>
-          <p:cNvPr id="5" name="Text Box 4"/>
-          <p:cNvSpPr txBox="1"/>
-          <p:nvPr/>
-        </p:nvSpPr>
-        <p:spPr>
-          <a:xfrm>
-            <a:off x="4681220" y="3409315"/>
-            <a:ext cx="2898140" cy="306705"/>
-          </a:xfrm>
-          <a:prstGeom prst="rect">
-            <a:avLst/>
-          </a:prstGeom>
-          <a:noFill/>
-          <a:ln>
-            <a:solidFill>
-              <a:schemeClr val="accent1"/>
-            </a:solidFill>
-          </a:ln>
-        </p:spPr>
-        <p:txBody>
-          <a:bodyPr wrap="square" rtlCol="0">
-            <a:spAutoFit/>
-          </a:bodyPr>
-          <a:p>
-            <a:r>
-              <a:rPr lang="en-US"/>
-              <a:t>listening on 127.0.0.1:9999</a:t>
-            </a:r>
-            <a:endParaRPr lang="en-US"/>
-          </a:p>
-        </p:txBody>
-      </p:sp>
-      <p:sp>
-        <p:nvSpPr>
-          <p:cNvPr id="6" name="Text Box 5"/>
-          <p:cNvSpPr txBox="1"/>
-          <p:nvPr/>
-        </p:nvSpPr>
-        <p:spPr>
-          <a:xfrm>
-            <a:off x="349250" y="4039235"/>
-            <a:ext cx="4639310" cy="521970"/>
-          </a:xfrm>
-          <a:prstGeom prst="rect">
-            <a:avLst/>
-          </a:prstGeom>
-          <a:noFill/>
-        </p:spPr>
-        <p:txBody>
-          <a:bodyPr wrap="square" rtlCol="0">
-            <a:spAutoFit/>
-          </a:bodyPr>
-          <a:p>
-            <a:r>
-              <a:rPr lang="en-US"/>
-              <a:t>It's not very easy to build </a:t>
-            </a:r>
-            <a:r>
-              <a:rPr lang="en-US">
-                <a:hlinkClick r:id="rId1" action="ppaction://hlinkfile"/>
-              </a:rPr>
-              <a:t>gdb in gcc toolchain </a:t>
-            </a:r>
-            <a:r>
-              <a:rPr lang="en-US"/>
-              <a:t>So we use gdb in docker instead.</a:t>
-            </a:r>
-            <a:endParaRPr lang="en-US"/>
-          </a:p>
-        </p:txBody>
-      </p:sp>
-      <p:sp>
-        <p:nvSpPr>
-          <p:cNvPr id="7" name="Text Box 6"/>
-          <p:cNvSpPr txBox="1"/>
-          <p:nvPr/>
-        </p:nvSpPr>
-        <p:spPr>
-          <a:xfrm>
-            <a:off x="3347720" y="2241550"/>
-            <a:ext cx="2061845" cy="306705"/>
-          </a:xfrm>
-          <a:prstGeom prst="rect">
-            <a:avLst/>
-          </a:prstGeom>
-          <a:noFill/>
-        </p:spPr>
-        <p:txBody>
-          <a:bodyPr wrap="square" rtlCol="0">
-            <a:spAutoFit/>
-          </a:bodyPr>
-          <a:p>
-            <a:r>
-              <a:rPr lang="en-US"/>
-              <a:t>GDB Remote Protocol</a:t>
-            </a:r>
-            <a:endParaRPr lang="en-US"/>
-          </a:p>
-        </p:txBody>
-      </p:sp>
     </p:spTree>
   </p:cSld>
   <p:clrMapOvr>

</xml_diff>

<commit_message>
updated according to new ckb-debugger
</commit_message>
<xml_diff>
--- a/slides/presentation.pptx
+++ b/slides/presentation.pptx
@@ -7,6 +7,9 @@
   <p:notesMasterIdLst>
     <p:notesMasterId r:id="rId4"/>
   </p:notesMasterIdLst>
+  <p:handoutMasterIdLst>
+    <p:handoutMasterId r:id="rId25"/>
+  </p:handoutMasterIdLst>
   <p:sldIdLst>
     <p:sldId id="256" r:id="rId3"/>
     <p:sldId id="269" r:id="rId5"/>
@@ -16,47 +19,50 @@
     <p:sldId id="272" r:id="rId9"/>
     <p:sldId id="274" r:id="rId10"/>
     <p:sldId id="277" r:id="rId11"/>
-    <p:sldId id="298" r:id="rId12"/>
-    <p:sldId id="275" r:id="rId13"/>
-    <p:sldId id="276" r:id="rId14"/>
-    <p:sldId id="278" r:id="rId15"/>
-    <p:sldId id="291" r:id="rId16"/>
-    <p:sldId id="273" r:id="rId17"/>
-    <p:sldId id="290" r:id="rId18"/>
-    <p:sldId id="284" r:id="rId19"/>
-    <p:sldId id="287" r:id="rId20"/>
-    <p:sldId id="267" r:id="rId21"/>
+    <p:sldId id="275" r:id="rId12"/>
+    <p:sldId id="276" r:id="rId13"/>
+    <p:sldId id="298" r:id="rId14"/>
+    <p:sldId id="308" r:id="rId15"/>
+    <p:sldId id="278" r:id="rId16"/>
+    <p:sldId id="291" r:id="rId17"/>
+    <p:sldId id="309" r:id="rId18"/>
+    <p:sldId id="310" r:id="rId19"/>
+    <p:sldId id="273" r:id="rId20"/>
+    <p:sldId id="290" r:id="rId21"/>
+    <p:sldId id="284" r:id="rId22"/>
+    <p:sldId id="287" r:id="rId23"/>
+    <p:sldId id="267" r:id="rId24"/>
   </p:sldIdLst>
   <p:sldSz cx="9144000" cy="5143500"/>
   <p:notesSz cx="6858000" cy="9144000"/>
   <p:embeddedFontLst>
     <p:embeddedFont>
       <p:font typeface="Montserrat" charset="0"/>
-      <p:regular r:id="rId25"/>
-      <p:bold r:id="rId26"/>
-      <p:italic r:id="rId27"/>
-      <p:boldItalic r:id="rId28"/>
-    </p:embeddedFont>
-    <p:embeddedFont>
-      <p:font typeface="Archivo Medium" charset="0"/>
       <p:regular r:id="rId29"/>
       <p:bold r:id="rId30"/>
       <p:italic r:id="rId31"/>
       <p:boldItalic r:id="rId32"/>
     </p:embeddedFont>
     <p:embeddedFont>
-      <p:font typeface="Montserrat Medium" charset="0"/>
+      <p:font typeface="Archivo Medium" charset="0"/>
       <p:regular r:id="rId33"/>
       <p:bold r:id="rId34"/>
       <p:italic r:id="rId35"/>
       <p:boldItalic r:id="rId36"/>
     </p:embeddedFont>
     <p:embeddedFont>
-      <p:font typeface="Archivo SemiBold" charset="0"/>
+      <p:font typeface="Montserrat Medium" charset="0"/>
       <p:regular r:id="rId37"/>
       <p:bold r:id="rId38"/>
       <p:italic r:id="rId39"/>
       <p:boldItalic r:id="rId40"/>
+    </p:embeddedFont>
+    <p:embeddedFont>
+      <p:font typeface="Archivo SemiBold" charset="0"/>
+      <p:regular r:id="rId41"/>
+      <p:bold r:id="rId42"/>
+      <p:italic r:id="rId43"/>
+      <p:boldItalic r:id="rId44"/>
     </p:embeddedFont>
   </p:embeddedFontLst>
   <p:defaultTextStyle>
@@ -289,6 +295,164 @@
     </a:lvl9pPr>
   </p:defaultTextStyle>
 </p:presentation>
+</file>
+
+<file path=ppt/handoutMasters/handoutMaster1.xml><?xml version="1.0" encoding="utf-8"?>
+<p:handoutMaster xmlns:a="http://schemas.openxmlformats.org/drawingml/2006/main" xmlns:r="http://schemas.openxmlformats.org/officeDocument/2006/relationships" xmlns:p="http://schemas.openxmlformats.org/presentationml/2006/main">
+  <p:cSld>
+    <p:bg>
+      <p:bgRef idx="1001">
+        <a:schemeClr val="bg1"/>
+      </p:bgRef>
+    </p:bg>
+    <p:spTree>
+      <p:nvGrpSpPr>
+        <p:cNvPr id="1" name=""/>
+        <p:cNvGrpSpPr/>
+        <p:nvPr/>
+      </p:nvGrpSpPr>
+      <p:grpSpPr>
+        <a:xfrm>
+          <a:off x="0" y="0"/>
+          <a:ext cx="0" cy="0"/>
+          <a:chOff x="0" y="0"/>
+          <a:chExt cx="0" cy="0"/>
+        </a:xfrm>
+      </p:grpSpPr>
+      <p:sp>
+        <p:nvSpPr>
+          <p:cNvPr id="2" name="Header Placeholder 1"/>
+          <p:cNvSpPr>
+            <a:spLocks noGrp="1"/>
+          </p:cNvSpPr>
+          <p:nvPr>
+            <p:ph type="hdr" sz="quarter"/>
+          </p:nvPr>
+        </p:nvSpPr>
+        <p:spPr>
+          <a:xfrm>
+            <a:off x="0" y="0"/>
+            <a:ext cx="2971800" cy="458788"/>
+          </a:xfrm>
+          <a:prstGeom prst="rect">
+            <a:avLst/>
+          </a:prstGeom>
+        </p:spPr>
+        <p:txBody>
+          <a:bodyPr vert="horz" lIns="91440" tIns="45720" rIns="91440" bIns="45720" rtlCol="0"/>
+          <a:lstStyle>
+            <a:lvl1pPr algn="l">
+              <a:defRPr sz="1200"/>
+            </a:lvl1pPr>
+          </a:lstStyle>
+          <a:p>
+            <a:endParaRPr lang="en-US"/>
+          </a:p>
+        </p:txBody>
+      </p:sp>
+      <p:sp>
+        <p:nvSpPr>
+          <p:cNvPr id="3" name="Date Placeholder 2"/>
+          <p:cNvSpPr>
+            <a:spLocks noGrp="1"/>
+          </p:cNvSpPr>
+          <p:nvPr>
+            <p:ph type="dt" sz="quarter" idx="1"/>
+          </p:nvPr>
+        </p:nvSpPr>
+        <p:spPr>
+          <a:xfrm>
+            <a:off x="3884613" y="0"/>
+            <a:ext cx="2971800" cy="458788"/>
+          </a:xfrm>
+          <a:prstGeom prst="rect">
+            <a:avLst/>
+          </a:prstGeom>
+        </p:spPr>
+        <p:txBody>
+          <a:bodyPr vert="horz" lIns="91440" tIns="45720" rIns="91440" bIns="45720" rtlCol="0"/>
+          <a:lstStyle>
+            <a:lvl1pPr algn="r">
+              <a:defRPr sz="1200"/>
+            </a:lvl1pPr>
+          </a:lstStyle>
+          <a:p>
+            <a:fld id="{696C064A-D61B-4B21-B757-51A9B82445B8}" type="datetimeFigureOut">
+              <a:rPr lang="en-US" smtClean="0"/>
+            </a:fld>
+            <a:endParaRPr lang="en-US"/>
+          </a:p>
+        </p:txBody>
+      </p:sp>
+      <p:sp>
+        <p:nvSpPr>
+          <p:cNvPr id="4" name="Footer Placeholder 3"/>
+          <p:cNvSpPr>
+            <a:spLocks noGrp="1"/>
+          </p:cNvSpPr>
+          <p:nvPr>
+            <p:ph type="ftr" sz="quarter" idx="2"/>
+          </p:nvPr>
+        </p:nvSpPr>
+        <p:spPr>
+          <a:xfrm>
+            <a:off x="0" y="8685213"/>
+            <a:ext cx="2971800" cy="458787"/>
+          </a:xfrm>
+          <a:prstGeom prst="rect">
+            <a:avLst/>
+          </a:prstGeom>
+        </p:spPr>
+        <p:txBody>
+          <a:bodyPr vert="horz" lIns="91440" tIns="45720" rIns="91440" bIns="45720" rtlCol="0" anchor="b"/>
+          <a:lstStyle>
+            <a:lvl1pPr algn="l">
+              <a:defRPr sz="1200"/>
+            </a:lvl1pPr>
+          </a:lstStyle>
+          <a:p>
+            <a:endParaRPr lang="en-US"/>
+          </a:p>
+        </p:txBody>
+      </p:sp>
+      <p:sp>
+        <p:nvSpPr>
+          <p:cNvPr id="5" name="Slide Number Placeholder 4"/>
+          <p:cNvSpPr>
+            <a:spLocks noGrp="1"/>
+          </p:cNvSpPr>
+          <p:nvPr>
+            <p:ph type="sldNum" sz="quarter" idx="3"/>
+          </p:nvPr>
+        </p:nvSpPr>
+        <p:spPr>
+          <a:xfrm>
+            <a:off x="3884613" y="8685213"/>
+            <a:ext cx="2971800" cy="458787"/>
+          </a:xfrm>
+          <a:prstGeom prst="rect">
+            <a:avLst/>
+          </a:prstGeom>
+        </p:spPr>
+        <p:txBody>
+          <a:bodyPr vert="horz" lIns="91440" tIns="45720" rIns="91440" bIns="45720" rtlCol="0" anchor="b"/>
+          <a:lstStyle>
+            <a:lvl1pPr algn="r">
+              <a:defRPr sz="1200"/>
+            </a:lvl1pPr>
+          </a:lstStyle>
+          <a:p>
+            <a:fld id="{50305E07-67EA-4042-A3F6-853A8AD8D209}" type="slidenum">
+              <a:rPr lang="en-US" smtClean="0"/>
+            </a:fld>
+            <a:endParaRPr lang="en-US"/>
+          </a:p>
+        </p:txBody>
+      </p:sp>
+    </p:spTree>
+  </p:cSld>
+  <p:clrMap bg1="lt1" tx1="dk1" bg2="lt2" tx2="dk2" accent1="accent1" accent2="accent2" accent3="accent3" accent4="accent4" accent5="accent5" accent6="accent6" hlink="hlink" folHlink="folHlink"/>
+</p:handoutMaster>
 </file>
 
 <file path=ppt/notesMasters/notesMaster1.xml><?xml version="1.0" encoding="utf-8"?>
@@ -1210,9 +1374,6 @@
               </a:spcAft>
               <a:buNone/>
             </a:pPr>
-            <a:endParaRPr lang="en-US" altLang="zh-CN">
-              <a:ea typeface="SimSun" charset="0"/>
-            </a:endParaRPr>
           </a:p>
         </p:txBody>
       </p:sp>
@@ -1312,6 +1473,9 @@
               </a:spcAft>
               <a:buNone/>
             </a:pPr>
+            <a:endParaRPr lang="en-US" altLang="zh-CN">
+              <a:ea typeface="SimSun" charset="0"/>
+            </a:endParaRPr>
           </a:p>
         </p:txBody>
       </p:sp>
@@ -1411,6 +1575,9 @@
               </a:spcAft>
               <a:buNone/>
             </a:pPr>
+            <a:endParaRPr lang="en-US" altLang="zh-CN">
+              <a:ea typeface="SimSun" charset="0"/>
+            </a:endParaRPr>
           </a:p>
         </p:txBody>
       </p:sp>
@@ -1510,6 +1677,9 @@
               </a:spcAft>
               <a:buNone/>
             </a:pPr>
+            <a:endParaRPr lang="en-US" altLang="zh-CN">
+              <a:ea typeface="SimSun" charset="0"/>
+            </a:endParaRPr>
           </a:p>
         </p:txBody>
       </p:sp>
@@ -1625,7 +1795,7 @@
   <p:cSld>
     <p:spTree>
       <p:nvGrpSpPr>
-        <p:cNvPr id="61" name="Shape 61"/>
+        <p:cNvPr id="46" name="Shape 46"/>
         <p:cNvGrpSpPr/>
         <p:nvPr/>
       </p:nvGrpSpPr>
@@ -1639,7 +1809,7 @@
       </p:grpSpPr>
       <p:sp>
         <p:nvSpPr>
-          <p:cNvPr id="62" name="Google Shape;62;g80d73bad10_0_17:notes"/>
+          <p:cNvPr id="47" name="Google Shape;47;g80d73bad10_0_27:notes"/>
           <p:cNvSpPr/>
           <p:nvPr>
             <p:ph type="sldImg" idx="2"/>
@@ -1678,7 +1848,106 @@
       </p:sp>
       <p:sp>
         <p:nvSpPr>
-          <p:cNvPr id="63" name="Google Shape;63;g80d73bad10_0_17:notes"/>
+          <p:cNvPr id="48" name="Google Shape;48;g80d73bad10_0_27:notes"/>
+          <p:cNvSpPr txBox="1"/>
+          <p:nvPr>
+            <p:ph type="body" idx="1"/>
+          </p:nvPr>
+        </p:nvSpPr>
+        <p:spPr>
+          <a:xfrm>
+            <a:off x="685800" y="4343400"/>
+            <a:ext cx="5486400" cy="4114800"/>
+          </a:xfrm>
+          <a:prstGeom prst="rect">
+            <a:avLst/>
+          </a:prstGeom>
+        </p:spPr>
+        <p:txBody>
+          <a:bodyPr spcFirstLastPara="1" wrap="square" lIns="91425" tIns="91425" rIns="91425" bIns="91425" anchor="t" anchorCtr="0">
+            <a:noAutofit/>
+          </a:bodyPr>
+          <a:lstStyle/>
+          <a:p>
+            <a:pPr marL="0" lvl="0" indent="0" algn="l" rtl="0">
+              <a:spcBef>
+                <a:spcPts val="0"/>
+              </a:spcBef>
+              <a:spcAft>
+                <a:spcPts val="0"/>
+              </a:spcAft>
+              <a:buNone/>
+            </a:pPr>
+          </a:p>
+        </p:txBody>
+      </p:sp>
+    </p:spTree>
+  </p:cSld>
+  <p:clrMapOvr>
+    <a:masterClrMapping/>
+  </p:clrMapOvr>
+</p:notes>
+</file>
+
+<file path=ppt/notesSlides/notesSlide19.xml><?xml version="1.0" encoding="utf-8"?>
+<p:notes xmlns:a="http://schemas.openxmlformats.org/drawingml/2006/main" xmlns:r="http://schemas.openxmlformats.org/officeDocument/2006/relationships" xmlns:p="http://schemas.openxmlformats.org/presentationml/2006/main" showMasterPhAnim="0" showMasterSp="0">
+  <p:cSld>
+    <p:spTree>
+      <p:nvGrpSpPr>
+        <p:cNvPr id="46" name="Shape 46"/>
+        <p:cNvGrpSpPr/>
+        <p:nvPr/>
+      </p:nvGrpSpPr>
+      <p:grpSpPr>
+        <a:xfrm>
+          <a:off x="0" y="0"/>
+          <a:ext cx="0" cy="0"/>
+          <a:chOff x="0" y="0"/>
+          <a:chExt cx="0" cy="0"/>
+        </a:xfrm>
+      </p:grpSpPr>
+      <p:sp>
+        <p:nvSpPr>
+          <p:cNvPr id="47" name="Google Shape;47;g80d73bad10_0_27:notes"/>
+          <p:cNvSpPr/>
+          <p:nvPr>
+            <p:ph type="sldImg" idx="2"/>
+          </p:nvPr>
+        </p:nvSpPr>
+        <p:spPr>
+          <a:xfrm>
+            <a:off x="381300" y="685800"/>
+            <a:ext cx="6096000" cy="3429000"/>
+          </a:xfrm>
+          <a:custGeom>
+            <a:avLst/>
+            <a:gdLst/>
+            <a:ahLst/>
+            <a:cxnLst/>
+            <a:rect l="l" t="t" r="r" b="b"/>
+            <a:pathLst>
+              <a:path w="120000" h="120000" extrusionOk="0">
+                <a:moveTo>
+                  <a:pt x="0" y="0"/>
+                </a:moveTo>
+                <a:lnTo>
+                  <a:pt x="120000" y="0"/>
+                </a:lnTo>
+                <a:lnTo>
+                  <a:pt x="120000" y="120000"/>
+                </a:lnTo>
+                <a:lnTo>
+                  <a:pt x="0" y="120000"/>
+                </a:lnTo>
+                <a:close/>
+              </a:path>
+            </a:pathLst>
+          </a:custGeom>
+        </p:spPr>
+      </p:sp>
+      <p:sp>
+        <p:nvSpPr>
+          <p:cNvPr id="48" name="Google Shape;48;g80d73bad10_0_27:notes"/>
           <p:cNvSpPr txBox="1"/>
           <p:nvPr>
             <p:ph type="body" idx="1"/>
@@ -1778,6 +2047,204 @@
       <p:sp>
         <p:nvSpPr>
           <p:cNvPr id="48" name="Google Shape;48;g80d73bad10_0_27:notes"/>
+          <p:cNvSpPr txBox="1"/>
+          <p:nvPr>
+            <p:ph type="body" idx="1"/>
+          </p:nvPr>
+        </p:nvSpPr>
+        <p:spPr>
+          <a:xfrm>
+            <a:off x="685800" y="4343400"/>
+            <a:ext cx="5486400" cy="4114800"/>
+          </a:xfrm>
+          <a:prstGeom prst="rect">
+            <a:avLst/>
+          </a:prstGeom>
+        </p:spPr>
+        <p:txBody>
+          <a:bodyPr spcFirstLastPara="1" wrap="square" lIns="91425" tIns="91425" rIns="91425" bIns="91425" anchor="t" anchorCtr="0">
+            <a:noAutofit/>
+          </a:bodyPr>
+          <a:lstStyle/>
+          <a:p>
+            <a:pPr marL="0" lvl="0" indent="0" algn="l" rtl="0">
+              <a:spcBef>
+                <a:spcPts val="0"/>
+              </a:spcBef>
+              <a:spcAft>
+                <a:spcPts val="0"/>
+              </a:spcAft>
+              <a:buNone/>
+            </a:pPr>
+          </a:p>
+        </p:txBody>
+      </p:sp>
+    </p:spTree>
+  </p:cSld>
+  <p:clrMapOvr>
+    <a:masterClrMapping/>
+  </p:clrMapOvr>
+</p:notes>
+</file>
+
+<file path=ppt/notesSlides/notesSlide20.xml><?xml version="1.0" encoding="utf-8"?>
+<p:notes xmlns:a="http://schemas.openxmlformats.org/drawingml/2006/main" xmlns:r="http://schemas.openxmlformats.org/officeDocument/2006/relationships" xmlns:p="http://schemas.openxmlformats.org/presentationml/2006/main" showMasterPhAnim="0" showMasterSp="0">
+  <p:cSld>
+    <p:spTree>
+      <p:nvGrpSpPr>
+        <p:cNvPr id="46" name="Shape 46"/>
+        <p:cNvGrpSpPr/>
+        <p:nvPr/>
+      </p:nvGrpSpPr>
+      <p:grpSpPr>
+        <a:xfrm>
+          <a:off x="0" y="0"/>
+          <a:ext cx="0" cy="0"/>
+          <a:chOff x="0" y="0"/>
+          <a:chExt cx="0" cy="0"/>
+        </a:xfrm>
+      </p:grpSpPr>
+      <p:sp>
+        <p:nvSpPr>
+          <p:cNvPr id="47" name="Google Shape;47;g80d73bad10_0_27:notes"/>
+          <p:cNvSpPr/>
+          <p:nvPr>
+            <p:ph type="sldImg" idx="2"/>
+          </p:nvPr>
+        </p:nvSpPr>
+        <p:spPr>
+          <a:xfrm>
+            <a:off x="381300" y="685800"/>
+            <a:ext cx="6096000" cy="3429000"/>
+          </a:xfrm>
+          <a:custGeom>
+            <a:avLst/>
+            <a:gdLst/>
+            <a:ahLst/>
+            <a:cxnLst/>
+            <a:rect l="l" t="t" r="r" b="b"/>
+            <a:pathLst>
+              <a:path w="120000" h="120000" extrusionOk="0">
+                <a:moveTo>
+                  <a:pt x="0" y="0"/>
+                </a:moveTo>
+                <a:lnTo>
+                  <a:pt x="120000" y="0"/>
+                </a:lnTo>
+                <a:lnTo>
+                  <a:pt x="120000" y="120000"/>
+                </a:lnTo>
+                <a:lnTo>
+                  <a:pt x="0" y="120000"/>
+                </a:lnTo>
+                <a:close/>
+              </a:path>
+            </a:pathLst>
+          </a:custGeom>
+        </p:spPr>
+      </p:sp>
+      <p:sp>
+        <p:nvSpPr>
+          <p:cNvPr id="48" name="Google Shape;48;g80d73bad10_0_27:notes"/>
+          <p:cNvSpPr txBox="1"/>
+          <p:nvPr>
+            <p:ph type="body" idx="1"/>
+          </p:nvPr>
+        </p:nvSpPr>
+        <p:spPr>
+          <a:xfrm>
+            <a:off x="685800" y="4343400"/>
+            <a:ext cx="5486400" cy="4114800"/>
+          </a:xfrm>
+          <a:prstGeom prst="rect">
+            <a:avLst/>
+          </a:prstGeom>
+        </p:spPr>
+        <p:txBody>
+          <a:bodyPr spcFirstLastPara="1" wrap="square" lIns="91425" tIns="91425" rIns="91425" bIns="91425" anchor="t" anchorCtr="0">
+            <a:noAutofit/>
+          </a:bodyPr>
+          <a:lstStyle/>
+          <a:p>
+            <a:pPr marL="0" lvl="0" indent="0" algn="l" rtl="0">
+              <a:spcBef>
+                <a:spcPts val="0"/>
+              </a:spcBef>
+              <a:spcAft>
+                <a:spcPts val="0"/>
+              </a:spcAft>
+              <a:buNone/>
+            </a:pPr>
+          </a:p>
+        </p:txBody>
+      </p:sp>
+    </p:spTree>
+  </p:cSld>
+  <p:clrMapOvr>
+    <a:masterClrMapping/>
+  </p:clrMapOvr>
+</p:notes>
+</file>
+
+<file path=ppt/notesSlides/notesSlide21.xml><?xml version="1.0" encoding="utf-8"?>
+<p:notes xmlns:a="http://schemas.openxmlformats.org/drawingml/2006/main" xmlns:r="http://schemas.openxmlformats.org/officeDocument/2006/relationships" xmlns:p="http://schemas.openxmlformats.org/presentationml/2006/main" showMasterPhAnim="0" showMasterSp="0">
+  <p:cSld>
+    <p:spTree>
+      <p:nvGrpSpPr>
+        <p:cNvPr id="61" name="Shape 61"/>
+        <p:cNvGrpSpPr/>
+        <p:nvPr/>
+      </p:nvGrpSpPr>
+      <p:grpSpPr>
+        <a:xfrm>
+          <a:off x="0" y="0"/>
+          <a:ext cx="0" cy="0"/>
+          <a:chOff x="0" y="0"/>
+          <a:chExt cx="0" cy="0"/>
+        </a:xfrm>
+      </p:grpSpPr>
+      <p:sp>
+        <p:nvSpPr>
+          <p:cNvPr id="62" name="Google Shape;62;g80d73bad10_0_17:notes"/>
+          <p:cNvSpPr/>
+          <p:nvPr>
+            <p:ph type="sldImg" idx="2"/>
+          </p:nvPr>
+        </p:nvSpPr>
+        <p:spPr>
+          <a:xfrm>
+            <a:off x="381300" y="685800"/>
+            <a:ext cx="6096000" cy="3429000"/>
+          </a:xfrm>
+          <a:custGeom>
+            <a:avLst/>
+            <a:gdLst/>
+            <a:ahLst/>
+            <a:cxnLst/>
+            <a:rect l="l" t="t" r="r" b="b"/>
+            <a:pathLst>
+              <a:path w="120000" h="120000" extrusionOk="0">
+                <a:moveTo>
+                  <a:pt x="0" y="0"/>
+                </a:moveTo>
+                <a:lnTo>
+                  <a:pt x="120000" y="0"/>
+                </a:lnTo>
+                <a:lnTo>
+                  <a:pt x="120000" y="120000"/>
+                </a:lnTo>
+                <a:lnTo>
+                  <a:pt x="0" y="120000"/>
+                </a:lnTo>
+                <a:close/>
+              </a:path>
+            </a:pathLst>
+          </a:custGeom>
+        </p:spPr>
+      </p:sp>
+      <p:sp>
+        <p:nvSpPr>
+          <p:cNvPr id="63" name="Google Shape;63;g80d73bad10_0_17:notes"/>
           <p:cNvSpPr txBox="1"/>
           <p:nvPr>
             <p:ph type="body" idx="1"/>
@@ -3871,7 +4338,7 @@
         <p:spPr>
           <a:xfrm>
             <a:off x="721995" y="600075"/>
-            <a:ext cx="8063865" cy="430530"/>
+            <a:ext cx="7203440" cy="430530"/>
           </a:xfrm>
           <a:prstGeom prst="rect">
             <a:avLst/>
@@ -3906,7 +4373,7 @@
                 <a:cs typeface="Noto Sans SC Black" panose="020B0A00000000000000" charset="-122"/>
                 <a:sym typeface="Montserrat" panose="00000300000000000000"/>
               </a:rPr>
-              <a:t>Debug Scripts with Simple Commands</a:t>
+              <a:t>Use GDB</a:t>
             </a:r>
             <a:endParaRPr lang="en-US" sz="2800" kern="100" spc="100">
               <a:solidFill>
@@ -3974,81 +4441,8 @@
         </p:nvSpPr>
         <p:spPr>
           <a:xfrm>
-            <a:off x="721995" y="1318895"/>
-            <a:ext cx="7439025" cy="1383665"/>
-          </a:xfrm>
-          <a:prstGeom prst="rect">
-            <a:avLst/>
-          </a:prstGeom>
-        </p:spPr>
-        <p:style>
-          <a:lnRef idx="2">
-            <a:schemeClr val="accent3">
-              <a:shade val="50000"/>
-            </a:schemeClr>
-          </a:lnRef>
-          <a:fillRef idx="1">
-            <a:schemeClr val="accent3"/>
-          </a:fillRef>
-          <a:effectRef idx="0">
-            <a:schemeClr val="accent3"/>
-          </a:effectRef>
-          <a:fontRef idx="minor">
-            <a:schemeClr val="lt1"/>
-          </a:fontRef>
-        </p:style>
-        <p:txBody>
-          <a:bodyPr wrap="square" rtlCol="0">
-            <a:spAutoFit/>
-          </a:bodyPr>
-          <a:p>
-            <a:pPr marL="0" indent="0">
-              <a:buFont typeface="Arial" panose="020B0604020202090204" pitchFamily="34" charset="0"/>
-              <a:buNone/>
-            </a:pPr>
-            <a:r>
-              <a:rPr lang="en-US"/>
-              <a:t>❯ make run-debugger</a:t>
-            </a:r>
-            <a:endParaRPr lang="en-US"/>
-          </a:p>
-          <a:p>
-            <a:pPr marL="0" indent="0">
-              <a:buFont typeface="Arial" panose="020B0604020202090204" pitchFamily="34" charset="0"/>
-              <a:buNone/>
-            </a:pPr>
-            <a:r>
-              <a:rPr lang="en-US"/>
-              <a:t>ckb-debugger --listen 127.0.0.1:9999 --tx-file sample-data/data1.json  --cell-index 0 --cell-type input --script-group-type lock \</a:t>
-            </a:r>
-            <a:endParaRPr lang="en-US"/>
-          </a:p>
-          <a:p>
-            <a:pPr marL="0" indent="0">
-              <a:buFont typeface="Arial" panose="020B0604020202090204" pitchFamily="34" charset="0"/>
-              <a:buNone/>
-            </a:pPr>
-            <a:r>
-              <a:rPr lang="en-US"/>
-              <a:t>	--replace-binary deps/ckb-system-scripts/specs/cells/secp256k1_blake160_sighash_all</a:t>
-            </a:r>
-            <a:endParaRPr lang="en-US"/>
-          </a:p>
-          <a:p>
-            <a:endParaRPr lang="en-US"/>
-          </a:p>
-        </p:txBody>
-      </p:sp>
-      <p:sp>
-        <p:nvSpPr>
-          <p:cNvPr id="2" name="Text Box 1"/>
-          <p:cNvSpPr txBox="1"/>
-          <p:nvPr/>
-        </p:nvSpPr>
-        <p:spPr>
-          <a:xfrm>
-            <a:off x="721995" y="2851150"/>
-            <a:ext cx="7409815" cy="1814830"/>
+            <a:off x="721995" y="1474470"/>
+            <a:ext cx="6633210" cy="1599565"/>
           </a:xfrm>
           <a:prstGeom prst="rect">
             <a:avLst/>
@@ -4073,37 +4467,108 @@
             <a:spAutoFit/>
           </a:bodyPr>
           <a:p>
+            <a:pPr marL="0" indent="0">
+              <a:buFont typeface="Arial" panose="020B0604020202090204" pitchFamily="34" charset="0"/>
+              <a:buNone/>
+            </a:pPr>
             <a:r>
               <a:rPr lang="en-US"/>
-              <a:t>❯ make run-docker</a:t>
-            </a:r>
-            <a:endParaRPr lang="en-US"/>
-          </a:p>
-          <a:p>
+              <a:t>(gdb) b 259</a:t>
+            </a:r>
+            <a:endParaRPr lang="en-US"/>
+          </a:p>
+          <a:p>
+            <a:pPr marL="0" indent="0">
+              <a:buFont typeface="Arial" panose="020B0604020202090204" pitchFamily="34" charset="0"/>
+              <a:buNone/>
+            </a:pPr>
             <a:r>
               <a:rPr lang="en-US"/>
-              <a:t>docker run --rm -it -v `pwd`:/code nervos/ckb-riscv-gnu-toolchain@sha256:aae8a3f79705f67d505d1f1d5ddc694a4fd537ed1c7e9622420a470d59ba2ec3 bash</a:t>
-            </a:r>
-            <a:endParaRPr lang="en-US"/>
-          </a:p>
-          <a:p>
+              <a:t>Breakpoint 2 at 0x1067e: file c/secp256k1_blake160_sighash_all.c, line 259.</a:t>
+            </a:r>
+            <a:endParaRPr lang="en-US"/>
+          </a:p>
+          <a:p>
+            <a:pPr marL="0" indent="0">
+              <a:buFont typeface="Arial" panose="020B0604020202090204" pitchFamily="34" charset="0"/>
+              <a:buNone/>
+            </a:pPr>
             <a:r>
               <a:rPr lang="en-US"/>
-              <a:t>root@2401d04549b4:/# cd code</a:t>
-            </a:r>
-            <a:endParaRPr lang="en-US"/>
-          </a:p>
-          <a:p>
+              <a:t>(gdb) p/x *args_bytes_seg.ptr@8 </a:t>
+            </a:r>
+            <a:endParaRPr lang="en-US"/>
+          </a:p>
+          <a:p>
+            <a:pPr marL="0" indent="0">
+              <a:buFont typeface="Arial" panose="020B0604020202090204" pitchFamily="34" charset="0"/>
+              <a:buNone/>
+            </a:pPr>
             <a:r>
               <a:rPr lang="en-US"/>
-              <a:t>root@2401d04549b4:/code# make run-gdb</a:t>
-            </a:r>
-            <a:endParaRPr lang="en-US"/>
-          </a:p>
-          <a:p>
+              <a:t>$3 = {0x32, 0xd6, 0x76, 0xb7, 0x36, 0xd5, 0x19, 0xf8}</a:t>
+            </a:r>
+            <a:endParaRPr lang="en-US"/>
+          </a:p>
+          <a:p>
+            <a:pPr marL="0" indent="0">
+              <a:buFont typeface="Arial" panose="020B0604020202090204" pitchFamily="34" charset="0"/>
+              <a:buNone/>
+            </a:pPr>
             <a:r>
               <a:rPr lang="en-US"/>
-              <a:t>cd deps/ckb-system-scripts &amp;&amp; riscv64-unknown-linux-gnu-gdb -ex "target remote host.docker.internal:9999" build/secp256k1_blake160_sighash_all.debug</a:t>
+              <a:t>(gdb) p/x *temp@8 </a:t>
+            </a:r>
+            <a:endParaRPr lang="en-US"/>
+          </a:p>
+          <a:p>
+            <a:pPr marL="0" indent="0">
+              <a:buFont typeface="Arial" panose="020B0604020202090204" pitchFamily="34" charset="0"/>
+              <a:buNone/>
+            </a:pPr>
+            <a:r>
+              <a:rPr lang="en-US"/>
+              <a:t>$5 = {0x32, 0xd6, 0x76, 0xb7, 0x36, 0xd5, 0x19, 0xf8}</a:t>
+            </a:r>
+            <a:endParaRPr lang="en-US"/>
+          </a:p>
+          <a:p>
+            <a:pPr marL="0" indent="0">
+              <a:buFont typeface="Arial" panose="020B0604020202090204" pitchFamily="34" charset="0"/>
+              <a:buNone/>
+            </a:pPr>
+            <a:r>
+              <a:rPr lang="en-US"/>
+              <a:t>(gdb) </a:t>
+            </a:r>
+            <a:endParaRPr lang="en-US"/>
+          </a:p>
+        </p:txBody>
+      </p:sp>
+      <p:sp>
+        <p:nvSpPr>
+          <p:cNvPr id="2" name="Text Box 1"/>
+          <p:cNvSpPr txBox="1"/>
+          <p:nvPr/>
+        </p:nvSpPr>
+        <p:spPr>
+          <a:xfrm>
+            <a:off x="5312410" y="3265805"/>
+            <a:ext cx="2871470" cy="521970"/>
+          </a:xfrm>
+          <a:prstGeom prst="rect">
+            <a:avLst/>
+          </a:prstGeom>
+          <a:noFill/>
+        </p:spPr>
+        <p:txBody>
+          <a:bodyPr wrap="square" rtlCol="0">
+            <a:spAutoFit/>
+          </a:bodyPr>
+          <a:p>
+            <a:r>
+              <a:rPr lang="en-US"/>
+              <a:t>Some commands are not supported, like “run”, however.</a:t>
             </a:r>
             <a:endParaRPr lang="en-US"/>
           </a:p>
@@ -4142,8 +4607,8 @@
         </p:nvSpPr>
         <p:spPr>
           <a:xfrm>
-            <a:off x="721995" y="600075"/>
-            <a:ext cx="7203440" cy="430530"/>
+            <a:off x="721995" y="599758"/>
+            <a:ext cx="4970780" cy="430530"/>
           </a:xfrm>
           <a:prstGeom prst="rect">
             <a:avLst/>
@@ -4154,7 +4619,7 @@
           </a:ln>
         </p:spPr>
         <p:txBody>
-          <a:bodyPr spcFirstLastPara="1" wrap="square" lIns="0" tIns="0" rIns="0" bIns="0" anchor="ctr" anchorCtr="0">
+          <a:bodyPr spcFirstLastPara="1" wrap="none" lIns="0" tIns="0" rIns="0" bIns="0" anchor="ctr" anchorCtr="0">
             <a:spAutoFit/>
           </a:bodyPr>
           <a:p>
@@ -4178,7 +4643,7 @@
                 <a:cs typeface="Noto Sans SC Black" panose="020B0A00000000000000" charset="-122"/>
                 <a:sym typeface="Montserrat" panose="00000300000000000000"/>
               </a:rPr>
-              <a:t>Use GDB</a:t>
+              <a:t>More information on --bin</a:t>
             </a:r>
             <a:endParaRPr lang="en-US" sz="2800" kern="100" spc="100">
               <a:solidFill>
@@ -4240,140 +4705,48 @@
       </p:sp>
       <p:sp>
         <p:nvSpPr>
-          <p:cNvPr id="1" name="Text Box 0"/>
+          <p:cNvPr id="2" name="Text Box 1"/>
           <p:cNvSpPr txBox="1"/>
           <p:nvPr/>
         </p:nvSpPr>
         <p:spPr>
           <a:xfrm>
-            <a:off x="721995" y="1474470"/>
-            <a:ext cx="6633210" cy="1599565"/>
-          </a:xfrm>
-          <a:prstGeom prst="rect">
-            <a:avLst/>
-          </a:prstGeom>
-          <a:solidFill>
-            <a:schemeClr val="accent4">
-              <a:lumMod val="20000"/>
-              <a:lumOff val="80000"/>
-            </a:schemeClr>
-          </a:solidFill>
-          <a:ln>
-            <a:solidFill>
-              <a:schemeClr val="accent4">
-                <a:lumMod val="20000"/>
-                <a:lumOff val="80000"/>
-              </a:schemeClr>
-            </a:solidFill>
-          </a:ln>
+            <a:off x="977900" y="1565275"/>
+            <a:ext cx="5939155" cy="1599565"/>
+          </a:xfrm>
+          <a:prstGeom prst="rect">
+            <a:avLst/>
+          </a:prstGeom>
+          <a:noFill/>
         </p:spPr>
         <p:txBody>
           <a:bodyPr wrap="square" rtlCol="0">
             <a:spAutoFit/>
           </a:bodyPr>
           <a:p>
-            <a:pPr marL="0" indent="0">
-              <a:buFont typeface="Arial" panose="020B0604020202090204" pitchFamily="34" charset="0"/>
-              <a:buNone/>
-            </a:pPr>
             <a:r>
               <a:rPr lang="en-US"/>
-              <a:t>(gdb) b 259</a:t>
-            </a:r>
-            <a:endParaRPr lang="en-US"/>
-          </a:p>
-          <a:p>
-            <a:pPr marL="0" indent="0">
-              <a:buFont typeface="Arial" panose="020B0604020202090204" pitchFamily="34" charset="0"/>
-              <a:buNone/>
-            </a:pPr>
+              <a:t>By default, ckb-debugger only loads and runs the code (RISCV-Binary) listed in mocked transaction file.</a:t>
+            </a:r>
+            <a:endParaRPr lang="en-US"/>
+          </a:p>
+          <a:p>
+            <a:endParaRPr lang="en-US"/>
+          </a:p>
+          <a:p>
             <a:r>
               <a:rPr lang="en-US"/>
-              <a:t>Breakpoint 2 at 0x1067e: file c/secp256k1_blake160_sighash_all.c, line 259.</a:t>
-            </a:r>
-            <a:endParaRPr lang="en-US"/>
-          </a:p>
-          <a:p>
-            <a:pPr marL="0" indent="0">
-              <a:buFont typeface="Arial" panose="020B0604020202090204" pitchFamily="34" charset="0"/>
-              <a:buNone/>
-            </a:pPr>
+              <a:t>The option --bin gives ckb-debugger a chance  to “replace” these code. </a:t>
+            </a:r>
+            <a:endParaRPr lang="en-US"/>
+          </a:p>
+          <a:p>
+            <a:endParaRPr lang="en-US"/>
+          </a:p>
+          <a:p>
             <a:r>
               <a:rPr lang="en-US"/>
-              <a:t>(gdb) p/x *args_bytes_seg.ptr@8 </a:t>
-            </a:r>
-            <a:endParaRPr lang="en-US"/>
-          </a:p>
-          <a:p>
-            <a:pPr marL="0" indent="0">
-              <a:buFont typeface="Arial" panose="020B0604020202090204" pitchFamily="34" charset="0"/>
-              <a:buNone/>
-            </a:pPr>
-            <a:r>
-              <a:rPr lang="en-US"/>
-              <a:t>$3 = {0x32, 0xd6, 0x76, 0xb7, 0x36, 0xd5, 0x19, 0xf8}</a:t>
-            </a:r>
-            <a:endParaRPr lang="en-US"/>
-          </a:p>
-          <a:p>
-            <a:pPr marL="0" indent="0">
-              <a:buFont typeface="Arial" panose="020B0604020202090204" pitchFamily="34" charset="0"/>
-              <a:buNone/>
-            </a:pPr>
-            <a:r>
-              <a:rPr lang="en-US"/>
-              <a:t>(gdb) p/x *temp@8 </a:t>
-            </a:r>
-            <a:endParaRPr lang="en-US"/>
-          </a:p>
-          <a:p>
-            <a:pPr marL="0" indent="0">
-              <a:buFont typeface="Arial" panose="020B0604020202090204" pitchFamily="34" charset="0"/>
-              <a:buNone/>
-            </a:pPr>
-            <a:r>
-              <a:rPr lang="en-US"/>
-              <a:t>$5 = {0x32, 0xd6, 0x76, 0xb7, 0x36, 0xd5, 0x19, 0xf8}</a:t>
-            </a:r>
-            <a:endParaRPr lang="en-US"/>
-          </a:p>
-          <a:p>
-            <a:pPr marL="0" indent="0">
-              <a:buFont typeface="Arial" panose="020B0604020202090204" pitchFamily="34" charset="0"/>
-              <a:buNone/>
-            </a:pPr>
-            <a:r>
-              <a:rPr lang="en-US"/>
-              <a:t>(gdb) </a:t>
-            </a:r>
-            <a:endParaRPr lang="en-US"/>
-          </a:p>
-        </p:txBody>
-      </p:sp>
-      <p:sp>
-        <p:nvSpPr>
-          <p:cNvPr id="2" name="Text Box 1"/>
-          <p:cNvSpPr txBox="1"/>
-          <p:nvPr/>
-        </p:nvSpPr>
-        <p:spPr>
-          <a:xfrm>
-            <a:off x="5312410" y="3265805"/>
-            <a:ext cx="2871470" cy="521970"/>
-          </a:xfrm>
-          <a:prstGeom prst="rect">
-            <a:avLst/>
-          </a:prstGeom>
-          <a:noFill/>
-        </p:spPr>
-        <p:txBody>
-          <a:bodyPr wrap="square" rtlCol="0">
-            <a:spAutoFit/>
-          </a:bodyPr>
-          <a:p>
-            <a:r>
-              <a:rPr lang="en-US"/>
-              <a:t>Some commands are not supported, like “run”, however.</a:t>
+              <a:t>We can modify source code, re-build it and use “--bin”  to run new code again.</a:t>
             </a:r>
             <a:endParaRPr lang="en-US"/>
           </a:p>
@@ -4412,8 +4785,8 @@
         </p:nvSpPr>
         <p:spPr>
           <a:xfrm>
-            <a:off x="721995" y="599758"/>
-            <a:ext cx="5103495" cy="430530"/>
+            <a:off x="721995" y="600075"/>
+            <a:ext cx="7203440" cy="430530"/>
           </a:xfrm>
           <a:prstGeom prst="rect">
             <a:avLst/>
@@ -4424,7 +4797,7 @@
           </a:ln>
         </p:spPr>
         <p:txBody>
-          <a:bodyPr spcFirstLastPara="1" wrap="none" lIns="0" tIns="0" rIns="0" bIns="0" anchor="ctr" anchorCtr="0">
+          <a:bodyPr spcFirstLastPara="1" wrap="square" lIns="0" tIns="0" rIns="0" bIns="0" anchor="ctr" anchorCtr="0">
             <a:spAutoFit/>
           </a:bodyPr>
           <a:p>
@@ -4448,7 +4821,7 @@
                 <a:cs typeface="Noto Sans SC Black" panose="020B0A00000000000000" charset="-122"/>
                 <a:sym typeface="Montserrat" panose="00000300000000000000"/>
               </a:rPr>
-              <a:t>Run Scripts Without Syscalls</a:t>
+              <a:t>--mode</a:t>
             </a:r>
             <a:endParaRPr lang="en-US" sz="2800" kern="100" spc="100">
               <a:solidFill>
@@ -4516,62 +4889,8 @@
         </p:nvSpPr>
         <p:spPr>
           <a:xfrm>
-            <a:off x="721995" y="1609725"/>
-            <a:ext cx="6633210" cy="1168400"/>
-          </a:xfrm>
-          <a:prstGeom prst="rect">
-            <a:avLst/>
-          </a:prstGeom>
-          <a:noFill/>
-        </p:spPr>
-        <p:txBody>
-          <a:bodyPr wrap="square" rtlCol="0">
-            <a:spAutoFit/>
-          </a:bodyPr>
-          <a:p>
-            <a:pPr marL="285750" indent="-285750">
-              <a:buFont typeface="Arial" panose="020B0604020202090204" pitchFamily="34" charset="0"/>
-              <a:buChar char="•"/>
-            </a:pPr>
-            <a:r>
-              <a:rPr lang="en-US"/>
-              <a:t>Sometime, we just want to run RISC-V binary directly without syscalls. e.g.: 3rd-party libraries</a:t>
-            </a:r>
-            <a:endParaRPr lang="en-US"/>
-          </a:p>
-          <a:p>
-            <a:pPr marL="285750" indent="-285750">
-              <a:buFont typeface="Arial" panose="020B0604020202090204" pitchFamily="34" charset="0"/>
-              <a:buChar char="•"/>
-            </a:pPr>
-            <a:r>
-              <a:rPr lang="en-US"/>
-              <a:t>Use command line option:  --simple-binary &lt;simple-binary&gt;</a:t>
-            </a:r>
-            <a:endParaRPr lang="en-US"/>
-          </a:p>
-          <a:p>
-            <a:pPr marL="285750" indent="-285750">
-              <a:buFont typeface="Arial" panose="020B0604020202090204" pitchFamily="34" charset="0"/>
-              <a:buChar char="•"/>
-            </a:pPr>
-            <a:endParaRPr lang="en-US"/>
-          </a:p>
-          <a:p>
-            <a:endParaRPr lang="en-US"/>
-          </a:p>
-        </p:txBody>
-      </p:sp>
-      <p:sp>
-        <p:nvSpPr>
-          <p:cNvPr id="2" name="Text Box 1"/>
-          <p:cNvSpPr txBox="1"/>
-          <p:nvPr/>
-        </p:nvSpPr>
-        <p:spPr>
-          <a:xfrm>
-            <a:off x="871220" y="2693035"/>
-            <a:ext cx="4234815" cy="953135"/>
+            <a:off x="721995" y="1480820"/>
+            <a:ext cx="6633210" cy="1814830"/>
           </a:xfrm>
           <a:prstGeom prst="rect">
             <a:avLst/>
@@ -4596,47 +4915,76 @@
             <a:spAutoFit/>
           </a:bodyPr>
           <a:p>
-            <a:pPr marL="0" indent="0">
+            <a:pPr marL="285750" indent="-285750">
               <a:buFont typeface="Arial" panose="020B0604020202090204" pitchFamily="34" charset="0"/>
-              <a:buNone/>
+              <a:buChar char="•"/>
             </a:pPr>
             <a:r>
               <a:rPr lang="en-US"/>
-              <a:t>❯ make run-simple-binary</a:t>
-            </a:r>
-            <a:endParaRPr lang="en-US"/>
-          </a:p>
-          <a:p>
-            <a:pPr marL="0" indent="0">
+              <a:t>full</a:t>
+            </a:r>
+            <a:endParaRPr lang="en-US"/>
+          </a:p>
+          <a:p>
+            <a:pPr marL="457200" lvl="1" indent="0">
               <a:buFont typeface="Arial" panose="020B0604020202090204" pitchFamily="34" charset="0"/>
               <a:buNone/>
             </a:pPr>
             <a:r>
               <a:rPr lang="en-US"/>
-              <a:t>ckb-debugger --simple-binary build/fib</a:t>
-            </a:r>
-            <a:endParaRPr lang="en-US"/>
-          </a:p>
-          <a:p>
-            <a:pPr marL="0" indent="0">
+              <a:t>Default mode. Don't need to specify. It can detect error and report backtrace.</a:t>
+            </a:r>
+            <a:endParaRPr lang="en-US"/>
+          </a:p>
+          <a:p>
+            <a:pPr marL="285750" indent="-285750">
               <a:buFont typeface="Arial" panose="020B0604020202090204" pitchFamily="34" charset="0"/>
-              <a:buNone/>
+              <a:buChar char="•"/>
             </a:pPr>
             <a:r>
               <a:rPr lang="en-US"/>
-              <a:t>Run result: 0</a:t>
-            </a:r>
-            <a:endParaRPr lang="en-US"/>
-          </a:p>
-          <a:p>
-            <a:pPr marL="0" indent="0">
+              <a:t>gdb</a:t>
+            </a:r>
+            <a:endParaRPr lang="en-US"/>
+          </a:p>
+          <a:p>
+            <a:pPr marL="457200" lvl="1" indent="0">
               <a:buFont typeface="Arial" panose="020B0604020202090204" pitchFamily="34" charset="0"/>
               <a:buNone/>
             </a:pPr>
             <a:r>
               <a:rPr lang="en-US"/>
-              <a:t>Total cycles consumed: 1847</a:t>
-            </a:r>
+              <a:t>Run it in gdb mode: listening on tcp port and wait for remote gdb to be attached.</a:t>
+            </a:r>
+            <a:endParaRPr lang="en-US"/>
+          </a:p>
+          <a:p>
+            <a:pPr marL="285750" indent="-285750">
+              <a:buFont typeface="Arial" panose="020B0604020202090204" pitchFamily="34" charset="0"/>
+              <a:buChar char="•"/>
+            </a:pPr>
+            <a:r>
+              <a:rPr lang="en-US"/>
+              <a:t>fast</a:t>
+            </a:r>
+            <a:endParaRPr lang="en-US"/>
+          </a:p>
+          <a:p>
+            <a:pPr marL="457200" lvl="1" indent="0">
+              <a:buFont typeface="Arial" panose="020B0604020202090204" pitchFamily="34" charset="0"/>
+              <a:buNone/>
+            </a:pPr>
+            <a:r>
+              <a:rPr lang="en-US"/>
+              <a:t>Run it without detecting any error. It's very fast but can't capture any error.</a:t>
+            </a:r>
+            <a:endParaRPr lang="en-US"/>
+          </a:p>
+          <a:p>
+            <a:pPr marL="285750" indent="-285750">
+              <a:buFont typeface="Arial" panose="020B0604020202090204" pitchFamily="34" charset="0"/>
+              <a:buChar char="•"/>
+            </a:pPr>
             <a:endParaRPr lang="en-US"/>
           </a:p>
         </p:txBody>
@@ -4675,7 +5023,7 @@
         <p:spPr>
           <a:xfrm>
             <a:off x="721995" y="599758"/>
-            <a:ext cx="6650355" cy="430530"/>
+            <a:ext cx="5103495" cy="430530"/>
           </a:xfrm>
           <a:prstGeom prst="rect">
             <a:avLst/>
@@ -4710,7 +5058,7 @@
                 <a:cs typeface="Noto Sans SC Black" panose="020B0A00000000000000" charset="-122"/>
                 <a:sym typeface="Montserrat" panose="00000300000000000000"/>
               </a:rPr>
-              <a:t>Print Backtrace When CKB-VM panic</a:t>
+              <a:t>Run Scripts Without Syscalls</a:t>
             </a:r>
             <a:endParaRPr lang="en-US" sz="2800" kern="100" spc="100">
               <a:solidFill>
@@ -4772,14 +5120,68 @@
       </p:sp>
       <p:sp>
         <p:nvSpPr>
+          <p:cNvPr id="1" name="Text Box 0"/>
+          <p:cNvSpPr txBox="1"/>
+          <p:nvPr/>
+        </p:nvSpPr>
+        <p:spPr>
+          <a:xfrm>
+            <a:off x="721995" y="1609725"/>
+            <a:ext cx="6633210" cy="1168400"/>
+          </a:xfrm>
+          <a:prstGeom prst="rect">
+            <a:avLst/>
+          </a:prstGeom>
+          <a:noFill/>
+        </p:spPr>
+        <p:txBody>
+          <a:bodyPr wrap="square" rtlCol="0">
+            <a:spAutoFit/>
+          </a:bodyPr>
+          <a:p>
+            <a:pPr marL="285750" indent="-285750">
+              <a:buFont typeface="Arial" panose="020B0604020202090204" pitchFamily="34" charset="0"/>
+              <a:buChar char="•"/>
+            </a:pPr>
+            <a:r>
+              <a:rPr lang="en-US"/>
+              <a:t>Sometime, we just want to run RISC-V binary directly without syscalls. e.g.: 3rd-party libraries</a:t>
+            </a:r>
+            <a:endParaRPr lang="en-US"/>
+          </a:p>
+          <a:p>
+            <a:pPr marL="285750" indent="-285750">
+              <a:buFont typeface="Arial" panose="020B0604020202090204" pitchFamily="34" charset="0"/>
+              <a:buChar char="•"/>
+            </a:pPr>
+            <a:r>
+              <a:rPr lang="en-US"/>
+              <a:t>Use command line option:  --bin &lt;simple-binary&gt;</a:t>
+            </a:r>
+            <a:endParaRPr lang="en-US"/>
+          </a:p>
+          <a:p>
+            <a:pPr marL="285750" indent="-285750">
+              <a:buFont typeface="Arial" panose="020B0604020202090204" pitchFamily="34" charset="0"/>
+              <a:buChar char="•"/>
+            </a:pPr>
+            <a:endParaRPr lang="en-US"/>
+          </a:p>
+          <a:p>
+            <a:endParaRPr lang="en-US"/>
+          </a:p>
+        </p:txBody>
+      </p:sp>
+      <p:sp>
+        <p:nvSpPr>
           <p:cNvPr id="2" name="Text Box 1"/>
           <p:cNvSpPr txBox="1"/>
           <p:nvPr/>
         </p:nvSpPr>
         <p:spPr>
           <a:xfrm>
-            <a:off x="821690" y="1812925"/>
-            <a:ext cx="4234815" cy="1814830"/>
+            <a:off x="871220" y="2693035"/>
+            <a:ext cx="4234815" cy="1168400"/>
           </a:xfrm>
           <a:prstGeom prst="rect">
             <a:avLst/>
@@ -4810,7 +5212,7 @@
             </a:pPr>
             <a:r>
               <a:rPr lang="en-US"/>
-              <a:t>❯ make run-simple-binary-panic</a:t>
+              <a:t>❯ make run-simple-binary</a:t>
             </a:r>
             <a:endParaRPr lang="en-US"/>
           </a:p>
@@ -4821,7 +5223,7 @@
             </a:pPr>
             <a:r>
               <a:rPr lang="en-US"/>
-              <a:t>ckb-debugger --pprof=/dev/null --simple-binary  build/panic</a:t>
+              <a:t>ckb-debugger --bin build/fib</a:t>
             </a:r>
             <a:endParaRPr lang="en-US"/>
           </a:p>
@@ -4832,7 +5234,7 @@
             </a:pPr>
             <a:r>
               <a:rPr lang="en-US"/>
-              <a:t>Backtrace:</a:t>
+              <a:t>Run result: 0</a:t>
             </a:r>
             <a:endParaRPr lang="en-US"/>
           </a:p>
@@ -4843,7 +5245,7 @@
             </a:pPr>
             <a:r>
               <a:rPr lang="en-US"/>
-              <a:t>??:??</a:t>
+              <a:t>Total cycles consumed: 4499</a:t>
             </a:r>
             <a:endParaRPr lang="en-US"/>
           </a:p>
@@ -4854,89 +5256,9 @@
             </a:pPr>
             <a:r>
               <a:rPr lang="en-US"/>
-              <a:t>/code/c/panic.c:main</a:t>
-            </a:r>
-            <a:endParaRPr lang="en-US"/>
-          </a:p>
-          <a:p>
-            <a:pPr marL="0" indent="0">
-              <a:buFont typeface="Arial" panose="020B0604020202090204" pitchFamily="34" charset="0"/>
-              <a:buNone/>
-            </a:pPr>
-            <a:r>
-              <a:rPr lang="en-US"/>
-              <a:t>/code/c/panic.c:7</a:t>
-            </a:r>
-            <a:endParaRPr lang="en-US"/>
-          </a:p>
-          <a:p>
-            <a:pPr marL="0" indent="0">
-              <a:buFont typeface="Arial" panose="020B0604020202090204" pitchFamily="34" charset="0"/>
-              <a:buNone/>
-            </a:pPr>
-            <a:r>
-              <a:rPr lang="en-US"/>
-              <a:t>Machine returned error code: OutOfBound</a:t>
-            </a:r>
-            <a:endParaRPr lang="en-US"/>
-          </a:p>
-        </p:txBody>
-      </p:sp>
-      <p:pic>
-        <p:nvPicPr>
-          <p:cNvPr id="3" name="Picture 2"/>
-          <p:cNvPicPr>
-            <a:picLocks noChangeAspect="1"/>
-          </p:cNvPicPr>
-          <p:nvPr/>
-        </p:nvPicPr>
-        <p:blipFill>
-          <a:blip r:embed="rId1"/>
-          <a:stretch>
-            <a:fillRect/>
-          </a:stretch>
-        </p:blipFill>
-        <p:spPr>
-          <a:xfrm>
-            <a:off x="5213350" y="1400175"/>
-            <a:ext cx="2550795" cy="1551305"/>
-          </a:xfrm>
-          <a:prstGeom prst="rect">
-            <a:avLst/>
-          </a:prstGeom>
-        </p:spPr>
-      </p:pic>
-      <p:sp>
-        <p:nvSpPr>
-          <p:cNvPr id="5" name="Text Box 4"/>
-          <p:cNvSpPr txBox="1"/>
-          <p:nvPr/>
-        </p:nvSpPr>
-        <p:spPr>
-          <a:xfrm>
-            <a:off x="5153025" y="3776980"/>
-            <a:ext cx="2527300" cy="645160"/>
-          </a:xfrm>
-          <a:prstGeom prst="rect">
-            <a:avLst/>
-          </a:prstGeom>
-          <a:solidFill>
-            <a:schemeClr val="accent3">
-              <a:lumMod val="20000"/>
-              <a:lumOff val="80000"/>
-            </a:schemeClr>
-          </a:solidFill>
-        </p:spPr>
-        <p:txBody>
-          <a:bodyPr wrap="square" rtlCol="0">
-            <a:spAutoFit/>
-          </a:bodyPr>
-          <a:p>
-            <a:r>
-              <a:rPr lang="en-US" sz="1200"/>
-              <a:t>Performance Profiling (--pprof) and Dumping backtrace share same internal implementation. </a:t>
-            </a:r>
-            <a:endParaRPr lang="en-US" sz="1200"/>
+              <a:t>Transfer cycles: 2652, running cycles: 1847</a:t>
+            </a:r>
+            <a:endParaRPr lang="en-US"/>
           </a:p>
         </p:txBody>
       </p:sp>
@@ -4974,7 +5296,7 @@
         <p:spPr>
           <a:xfrm>
             <a:off x="721995" y="599758"/>
-            <a:ext cx="3877945" cy="430530"/>
+            <a:ext cx="6650355" cy="430530"/>
           </a:xfrm>
           <a:prstGeom prst="rect">
             <a:avLst/>
@@ -5009,7 +5331,7 @@
                 <a:cs typeface="Noto Sans SC Black" panose="020B0A00000000000000" charset="-122"/>
                 <a:sym typeface="Montserrat" panose="00000300000000000000"/>
               </a:rPr>
-              <a:t>Performance Profiling</a:t>
+              <a:t>Print Backtrace When CKB-VM panic</a:t>
             </a:r>
             <a:endParaRPr lang="en-US" sz="2800" kern="100" spc="100">
               <a:solidFill>
@@ -5071,75 +5393,14 @@
       </p:sp>
       <p:sp>
         <p:nvSpPr>
-          <p:cNvPr id="1" name="Text Box 0"/>
-          <p:cNvSpPr txBox="1"/>
-          <p:nvPr/>
-        </p:nvSpPr>
-        <p:spPr>
-          <a:xfrm>
-            <a:off x="721995" y="1609725"/>
-            <a:ext cx="6633210" cy="1168400"/>
-          </a:xfrm>
-          <a:prstGeom prst="rect">
-            <a:avLst/>
-          </a:prstGeom>
-          <a:noFill/>
-        </p:spPr>
-        <p:txBody>
-          <a:bodyPr wrap="square" rtlCol="0">
-            <a:spAutoFit/>
-          </a:bodyPr>
-          <a:p>
-            <a:pPr marL="285750" indent="-285750">
-              <a:buFont typeface="Arial" panose="020B0604020202090204" pitchFamily="34" charset="0"/>
-              <a:buChar char="•"/>
-            </a:pPr>
-            <a:r>
-              <a:rPr lang="en-US"/>
-              <a:t>Another important feature</a:t>
-            </a:r>
-            <a:endParaRPr lang="en-US"/>
-          </a:p>
-          <a:p>
-            <a:pPr marL="285750" indent="-285750">
-              <a:buFont typeface="Arial" panose="020B0604020202090204" pitchFamily="34" charset="0"/>
-              <a:buChar char="•"/>
-            </a:pPr>
-            <a:r>
-              <a:rPr lang="en-US"/>
-              <a:t>It can enabled by --pprof=&lt;output file for inferno-flamegraph&gt;</a:t>
-            </a:r>
-            <a:endParaRPr lang="en-US"/>
-          </a:p>
-          <a:p>
-            <a:pPr marL="285750" indent="-285750">
-              <a:buFont typeface="Arial" panose="020B0604020202090204" pitchFamily="34" charset="0"/>
-              <a:buChar char="•"/>
-            </a:pPr>
-            <a:endParaRPr lang="en-US"/>
-          </a:p>
-          <a:p>
-            <a:pPr marL="285750" indent="-285750">
-              <a:buFont typeface="Arial" panose="020B0604020202090204" pitchFamily="34" charset="0"/>
-              <a:buChar char="•"/>
-            </a:pPr>
-            <a:endParaRPr lang="en-US"/>
-          </a:p>
-          <a:p>
-            <a:endParaRPr lang="en-US"/>
-          </a:p>
-        </p:txBody>
-      </p:sp>
-      <p:sp>
-        <p:nvSpPr>
           <p:cNvPr id="2" name="Text Box 1"/>
           <p:cNvSpPr txBox="1"/>
           <p:nvPr/>
         </p:nvSpPr>
         <p:spPr>
           <a:xfrm>
-            <a:off x="821690" y="2271395"/>
-            <a:ext cx="6210935" cy="1599565"/>
+            <a:off x="821690" y="1812925"/>
+            <a:ext cx="4234815" cy="1814830"/>
           </a:xfrm>
           <a:prstGeom prst="rect">
             <a:avLst/>
@@ -5170,7 +5431,7 @@
             </a:pPr>
             <a:r>
               <a:rPr lang="en-US"/>
-              <a:t>❯ make run-simple-binary-pprof</a:t>
+              <a:t>❯ make run-simple-binary-panic</a:t>
             </a:r>
             <a:endParaRPr lang="en-US"/>
           </a:p>
@@ -5181,7 +5442,7 @@
             </a:pPr>
             <a:r>
               <a:rPr lang="en-US"/>
-              <a:t>ckb-debugger --simple-binary build/fib --pprof=build/fib.pprof</a:t>
+              <a:t>ckb-debugger --bin  build/panic</a:t>
             </a:r>
             <a:endParaRPr lang="en-US"/>
           </a:p>
@@ -5192,7 +5453,7 @@
             </a:pPr>
             <a:r>
               <a:rPr lang="en-US"/>
-              <a:t>Run result: 0</a:t>
+              <a:t>Trace:</a:t>
             </a:r>
             <a:endParaRPr lang="en-US"/>
           </a:p>
@@ -5203,7 +5464,7 @@
             </a:pPr>
             <a:r>
               <a:rPr lang="en-US"/>
-              <a:t>Total cycles consumed: 1847</a:t>
+              <a:t>  ??:??:??</a:t>
             </a:r>
             <a:endParaRPr lang="en-US"/>
           </a:p>
@@ -5212,6 +5473,10 @@
               <a:buFont typeface="Arial" panose="020B0604020202090204" pitchFamily="34" charset="0"/>
               <a:buNone/>
             </a:pPr>
+            <a:r>
+              <a:rPr lang="en-US"/>
+              <a:t>  /code/deps/ckb-c-stdlib/libc/entry.h:9:_start</a:t>
+            </a:r>
             <a:endParaRPr lang="en-US"/>
           </a:p>
           <a:p>
@@ -5221,7 +5486,7 @@
             </a:pPr>
             <a:r>
               <a:rPr lang="en-US"/>
-              <a:t>cat build/fib.pprof | inferno-flamegraph &gt; build/fib.svg</a:t>
+              <a:t>  /code/c/panic.c:7:main</a:t>
             </a:r>
             <a:endParaRPr lang="en-US"/>
           </a:p>
@@ -5230,10 +5495,49 @@
               <a:buFont typeface="Arial" panose="020B0604020202090204" pitchFamily="34" charset="0"/>
               <a:buNone/>
             </a:pPr>
-            <a:endParaRPr lang="en-US"/>
-          </a:p>
-        </p:txBody>
-      </p:sp>
+            <a:r>
+              <a:rPr lang="en-US"/>
+              <a:t>Error:</a:t>
+            </a:r>
+            <a:endParaRPr lang="en-US"/>
+          </a:p>
+          <a:p>
+            <a:pPr marL="0" indent="0">
+              <a:buFont typeface="Arial" panose="020B0604020202090204" pitchFamily="34" charset="0"/>
+              <a:buNone/>
+            </a:pPr>
+            <a:r>
+              <a:rPr lang="en-US"/>
+              <a:t>  OutOfBound</a:t>
+            </a:r>
+            <a:endParaRPr lang="en-US"/>
+          </a:p>
+        </p:txBody>
+      </p:sp>
+      <p:pic>
+        <p:nvPicPr>
+          <p:cNvPr id="3" name="Picture 2"/>
+          <p:cNvPicPr>
+            <a:picLocks noChangeAspect="1"/>
+          </p:cNvPicPr>
+          <p:nvPr/>
+        </p:nvPicPr>
+        <p:blipFill>
+          <a:blip r:embed="rId1"/>
+          <a:stretch>
+            <a:fillRect/>
+          </a:stretch>
+        </p:blipFill>
+        <p:spPr>
+          <a:xfrm>
+            <a:off x="5213350" y="1400175"/>
+            <a:ext cx="2550795" cy="1551305"/>
+          </a:xfrm>
+          <a:prstGeom prst="rect">
+            <a:avLst/>
+          </a:prstGeom>
+        </p:spPr>
+      </p:pic>
     </p:spTree>
   </p:cSld>
   <p:clrMapOvr>
@@ -5268,7 +5572,7 @@
         <p:spPr>
           <a:xfrm>
             <a:off x="721995" y="599758"/>
-            <a:ext cx="2191385" cy="430530"/>
+            <a:ext cx="6052185" cy="430530"/>
           </a:xfrm>
           <a:prstGeom prst="rect">
             <a:avLst/>
@@ -5303,7 +5607,7 @@
                 <a:cs typeface="Noto Sans SC Black" panose="020B0A00000000000000" charset="-122"/>
                 <a:sym typeface="Montserrat" panose="00000300000000000000"/>
               </a:rPr>
-              <a:t>Flamegraph </a:t>
+              <a:t>Detect Heap/Stack Overlapping</a:t>
             </a:r>
             <a:endParaRPr lang="en-US" sz="2800" kern="100" spc="100">
               <a:solidFill>
@@ -5363,16 +5667,139 @@
           </a:p>
         </p:txBody>
       </p:sp>
-      <p:sp>
-        <p:nvSpPr>
-          <p:cNvPr id="1" name="Text Box 0"/>
+      <p:graphicFrame>
+        <p:nvGraphicFramePr>
+          <p:cNvPr id="1" name="Table 0"/>
+          <p:cNvGraphicFramePr/>
+          <p:nvPr/>
+        </p:nvGraphicFramePr>
+        <p:xfrm>
+          <a:off x="1028700" y="2294890"/>
+          <a:ext cx="6400800" cy="445135"/>
+        </p:xfrm>
+        <a:graphic>
+          <a:graphicData uri="http://schemas.openxmlformats.org/drawingml/2006/table">
+            <a:tbl>
+              <a:tblPr firstRow="1" bandRow="1">
+                <a:tableStyleId>{5C22544A-7EE6-4342-B048-85BDC9FD1C3A}</a:tableStyleId>
+              </a:tblPr>
+              <a:tblGrid>
+                <a:gridCol w="1600200"/>
+                <a:gridCol w="1364615"/>
+                <a:gridCol w="1835785"/>
+                <a:gridCol w="1600200"/>
+              </a:tblGrid>
+              <a:tr h="445135">
+                <a:tc>
+                  <a:txBody>
+                    <a:bodyPr/>
+                    <a:p>
+                      <a:pPr>
+                        <a:buNone/>
+                      </a:pPr>
+                      <a:r>
+                        <a:rPr lang="en-US"/>
+                        <a:t>Text/Data/Bss...</a:t>
+                      </a:r>
+                      <a:endParaRPr lang="en-US"/>
+                    </a:p>
+                  </a:txBody>
+                  <a:tcPr>
+                    <a:gradFill>
+                      <a:gsLst>
+                        <a:gs pos="0">
+                          <a:srgbClr val="007BD3"/>
+                        </a:gs>
+                        <a:gs pos="100000">
+                          <a:srgbClr val="034373"/>
+                        </a:gs>
+                      </a:gsLst>
+                      <a:lin ang="5400000" scaled="0"/>
+                    </a:gradFill>
+                  </a:tcPr>
+                </a:tc>
+                <a:tc>
+                  <a:txBody>
+                    <a:bodyPr/>
+                    <a:p>
+                      <a:pPr>
+                        <a:buNone/>
+                      </a:pPr>
+                      <a:r>
+                        <a:rPr lang="en-US"/>
+                        <a:t>Heap</a:t>
+                      </a:r>
+                      <a:endParaRPr lang="en-US"/>
+                    </a:p>
+                  </a:txBody>
+                  <a:tcPr>
+                    <a:gradFill>
+                      <a:gsLst>
+                        <a:gs pos="0">
+                          <a:srgbClr val="FBFB11"/>
+                        </a:gs>
+                        <a:gs pos="100000">
+                          <a:srgbClr val="838309"/>
+                        </a:gs>
+                      </a:gsLst>
+                      <a:lin ang="5400000" scaled="0"/>
+                    </a:gradFill>
+                  </a:tcPr>
+                </a:tc>
+                <a:tc>
+                  <a:txBody>
+                    <a:bodyPr/>
+                    <a:p>
+                      <a:pPr>
+                        <a:buNone/>
+                      </a:pPr>
+                      <a:r>
+                        <a:rPr lang="en-US"/>
+                        <a:t>Not Used</a:t>
+                      </a:r>
+                      <a:endParaRPr lang="en-US"/>
+                    </a:p>
+                  </a:txBody>
+                  <a:tcPr>
+                    <a:solidFill>
+                      <a:schemeClr val="tx1">
+                        <a:lumMod val="50000"/>
+                        <a:lumOff val="50000"/>
+                      </a:schemeClr>
+                    </a:solidFill>
+                  </a:tcPr>
+                </a:tc>
+                <a:tc>
+                  <a:txBody>
+                    <a:bodyPr/>
+                    <a:p>
+                      <a:pPr>
+                        <a:buNone/>
+                      </a:pPr>
+                      <a:r>
+                        <a:rPr lang="en-US"/>
+                        <a:t>Stack</a:t>
+                      </a:r>
+                      <a:endParaRPr lang="en-US"/>
+                    </a:p>
+                  </a:txBody>
+                  <a:tcPr/>
+                </a:tc>
+              </a:tr>
+            </a:tbl>
+          </a:graphicData>
+        </a:graphic>
+      </p:graphicFrame>
+      <p:sp>
+        <p:nvSpPr>
+          <p:cNvPr id="4" name="Text Box 3"/>
           <p:cNvSpPr txBox="1"/>
           <p:nvPr/>
         </p:nvSpPr>
         <p:spPr>
           <a:xfrm>
-            <a:off x="721995" y="1609725"/>
-            <a:ext cx="6633210" cy="1383665"/>
+            <a:off x="7209155" y="2884805"/>
+            <a:ext cx="485140" cy="306705"/>
           </a:xfrm>
           <a:prstGeom prst="rect">
             <a:avLst/>
@@ -5384,111 +5811,316 @@
             <a:spAutoFit/>
           </a:bodyPr>
           <a:p>
-            <a:pPr marL="285750" indent="-285750">
-              <a:buFont typeface="Arial" panose="020B0604020202090204" pitchFamily="34" charset="0"/>
-              <a:buChar char="•"/>
-            </a:pPr>
             <a:r>
               <a:rPr lang="en-US"/>
-              <a:t>We use </a:t>
-            </a:r>
-            <a:r>
-              <a:rPr lang="en-US">
-                <a:hlinkClick r:id="rId1" action="ppaction://hlinkfile"/>
-              </a:rPr>
-              <a:t>inferno-flamegraph</a:t>
-            </a:r>
-            <a:endParaRPr lang="en-US">
-              <a:hlinkClick r:id="rId1" action="ppaction://hlinkfile"/>
-            </a:endParaRPr>
-          </a:p>
-          <a:p>
-            <a:pPr marL="285750" indent="-285750">
-              <a:buFont typeface="Arial" panose="020B0604020202090204" pitchFamily="34" charset="0"/>
-              <a:buChar char="•"/>
-            </a:pPr>
-            <a:endParaRPr lang="en-US">
-              <a:hlinkClick r:id="rId1" action="ppaction://hlinkfile"/>
-            </a:endParaRPr>
-          </a:p>
-          <a:p>
-            <a:pPr marL="285750" indent="-285750">
-              <a:buFont typeface="Arial" panose="020B0604020202090204" pitchFamily="34" charset="0"/>
-              <a:buChar char="•"/>
-            </a:pPr>
-            <a:endParaRPr lang="en-US">
-              <a:hlinkClick r:id="rId1" action="ppaction://hlinkfile"/>
-            </a:endParaRPr>
-          </a:p>
-          <a:p>
-            <a:pPr marL="285750" indent="-285750">
-              <a:buFont typeface="Arial" panose="020B0604020202090204" pitchFamily="34" charset="0"/>
-              <a:buChar char="•"/>
-            </a:pPr>
-            <a:endParaRPr lang="en-US">
-              <a:hlinkClick r:id="rId1" action="ppaction://hlinkfile"/>
-            </a:endParaRPr>
-          </a:p>
-          <a:p>
-            <a:pPr marL="285750" indent="-285750">
-              <a:buFont typeface="Arial" panose="020B0604020202090204" pitchFamily="34" charset="0"/>
-              <a:buChar char="•"/>
-            </a:pPr>
-            <a:endParaRPr lang="en-US"/>
-          </a:p>
-          <a:p>
-            <a:endParaRPr lang="en-US"/>
-          </a:p>
-        </p:txBody>
-      </p:sp>
-      <p:pic>
-        <p:nvPicPr>
-          <p:cNvPr id="3" name="Picture 2"/>
-          <p:cNvPicPr>
-            <a:picLocks noChangeAspect="1"/>
-          </p:cNvPicPr>
+              <a:t>4M</a:t>
+            </a:r>
+            <a:endParaRPr lang="en-US"/>
+          </a:p>
+        </p:txBody>
+      </p:sp>
+      <p:sp>
+        <p:nvSpPr>
+          <p:cNvPr id="5" name="Left Arrow 4"/>
+          <p:cNvSpPr/>
           <p:nvPr/>
-        </p:nvPicPr>
-        <p:blipFill>
-          <a:blip r:embed="rId2"/>
-          <a:stretch>
-            <a:fillRect/>
-          </a:stretch>
-        </p:blipFill>
-        <p:spPr>
-          <a:xfrm>
-            <a:off x="6037580" y="600075"/>
-            <a:ext cx="2649220" cy="1695450"/>
-          </a:xfrm>
-          <a:prstGeom prst="rect">
-            <a:avLst/>
-          </a:prstGeom>
-        </p:spPr>
-      </p:pic>
-      <p:pic>
-        <p:nvPicPr>
-          <p:cNvPr id="4" name="Picture 3"/>
-          <p:cNvPicPr>
-            <a:picLocks noChangeAspect="1"/>
-          </p:cNvPicPr>
+        </p:nvSpPr>
+        <p:spPr>
+          <a:xfrm>
+            <a:off x="6174105" y="2978150"/>
+            <a:ext cx="1099185" cy="167640"/>
+          </a:xfrm>
+          <a:prstGeom prst="leftArrow">
+            <a:avLst/>
+          </a:prstGeom>
+          <a:ln>
+            <a:solidFill>
+              <a:schemeClr val="bg1"/>
+            </a:solidFill>
+          </a:ln>
+        </p:spPr>
+        <p:style>
+          <a:lnRef idx="2">
+            <a:schemeClr val="accent1">
+              <a:shade val="50000"/>
+            </a:schemeClr>
+          </a:lnRef>
+          <a:fillRef idx="1">
+            <a:schemeClr val="accent1"/>
+          </a:fillRef>
+          <a:effectRef idx="0">
+            <a:schemeClr val="accent1"/>
+          </a:effectRef>
+          <a:fontRef idx="minor">
+            <a:schemeClr val="lt1"/>
+          </a:fontRef>
+        </p:style>
+        <p:txBody>
+          <a:bodyPr rtlCol="0" anchor="ctr"/>
+          <a:p>
+            <a:pPr algn="ctr"/>
+            <a:endParaRPr lang="en-US"/>
+          </a:p>
+        </p:txBody>
+      </p:sp>
+      <p:sp>
+        <p:nvSpPr>
+          <p:cNvPr id="6" name="Text Box 5"/>
+          <p:cNvSpPr txBox="1"/>
           <p:nvPr/>
-        </p:nvPicPr>
-        <p:blipFill>
-          <a:blip r:embed="rId3"/>
-          <a:stretch>
-            <a:fillRect/>
-          </a:stretch>
-        </p:blipFill>
-        <p:spPr>
-          <a:xfrm>
-            <a:off x="721995" y="2435860"/>
-            <a:ext cx="8014335" cy="2339340"/>
-          </a:xfrm>
-          <a:prstGeom prst="rect">
-            <a:avLst/>
-          </a:prstGeom>
-        </p:spPr>
-      </p:pic>
+        </p:nvSpPr>
+        <p:spPr>
+          <a:xfrm>
+            <a:off x="2454910" y="2895600"/>
+            <a:ext cx="235585" cy="306705"/>
+          </a:xfrm>
+          <a:prstGeom prst="rect">
+            <a:avLst/>
+          </a:prstGeom>
+          <a:noFill/>
+        </p:spPr>
+        <p:txBody>
+          <a:bodyPr wrap="square" rtlCol="0">
+            <a:spAutoFit/>
+          </a:bodyPr>
+          <a:p>
+            <a:r>
+              <a:rPr lang="en-US"/>
+              <a:t>??</a:t>
+            </a:r>
+            <a:endParaRPr lang="en-US"/>
+          </a:p>
+        </p:txBody>
+      </p:sp>
+      <p:sp>
+        <p:nvSpPr>
+          <p:cNvPr id="7" name="Right Arrow 6"/>
+          <p:cNvSpPr/>
+          <p:nvPr/>
+        </p:nvSpPr>
+        <p:spPr>
+          <a:xfrm>
+            <a:off x="2826385" y="2978150"/>
+            <a:ext cx="1085215" cy="192405"/>
+          </a:xfrm>
+          <a:prstGeom prst="rightArrow">
+            <a:avLst/>
+          </a:prstGeom>
+          <a:gradFill>
+            <a:gsLst>
+              <a:gs pos="4000">
+                <a:srgbClr val="FBFB11">
+                  <a:alpha val="100000"/>
+                </a:srgbClr>
+              </a:gs>
+              <a:gs pos="26000">
+                <a:srgbClr val="FBFB11"/>
+              </a:gs>
+              <a:gs pos="100000">
+                <a:srgbClr val="838309"/>
+              </a:gs>
+            </a:gsLst>
+            <a:lin ang="5400000" scaled="0"/>
+          </a:gradFill>
+          <a:ln>
+            <a:solidFill>
+              <a:schemeClr val="bg1"/>
+            </a:solidFill>
+          </a:ln>
+        </p:spPr>
+        <p:style>
+          <a:lnRef idx="2">
+            <a:schemeClr val="accent1">
+              <a:shade val="50000"/>
+            </a:schemeClr>
+          </a:lnRef>
+          <a:fillRef idx="1">
+            <a:schemeClr val="accent1"/>
+          </a:fillRef>
+          <a:effectRef idx="0">
+            <a:schemeClr val="accent1"/>
+          </a:effectRef>
+          <a:fontRef idx="minor">
+            <a:schemeClr val="lt1"/>
+          </a:fontRef>
+        </p:style>
+        <p:txBody>
+          <a:bodyPr rtlCol="0" anchor="ctr"/>
+          <a:p>
+            <a:pPr algn="ctr"/>
+            <a:endParaRPr lang="en-US"/>
+          </a:p>
+        </p:txBody>
+      </p:sp>
+      <p:sp>
+        <p:nvSpPr>
+          <p:cNvPr id="8" name="Text Box 7"/>
+          <p:cNvSpPr txBox="1"/>
+          <p:nvPr/>
+        </p:nvSpPr>
+        <p:spPr>
+          <a:xfrm>
+            <a:off x="3244215" y="1750060"/>
+            <a:ext cx="2654935" cy="306705"/>
+          </a:xfrm>
+          <a:prstGeom prst="rect">
+            <a:avLst/>
+          </a:prstGeom>
+          <a:noFill/>
+        </p:spPr>
+        <p:txBody>
+          <a:bodyPr wrap="square" rtlCol="0">
+            <a:spAutoFit/>
+          </a:bodyPr>
+          <a:p>
+            <a:r>
+              <a:rPr lang="en-US"/>
+              <a:t>CKB-VM Memory Layout</a:t>
+            </a:r>
+            <a:endParaRPr lang="en-US"/>
+          </a:p>
+        </p:txBody>
+      </p:sp>
+      <p:sp>
+        <p:nvSpPr>
+          <p:cNvPr id="9" name="Text Box 8"/>
+          <p:cNvSpPr txBox="1"/>
+          <p:nvPr/>
+        </p:nvSpPr>
+        <p:spPr>
+          <a:xfrm>
+            <a:off x="2062480" y="3484880"/>
+            <a:ext cx="1805305" cy="306705"/>
+          </a:xfrm>
+          <a:prstGeom prst="rect">
+            <a:avLst/>
+          </a:prstGeom>
+          <a:noFill/>
+        </p:spPr>
+        <p:txBody>
+          <a:bodyPr wrap="square" rtlCol="0">
+            <a:spAutoFit/>
+          </a:bodyPr>
+          <a:p>
+            <a:r>
+              <a:rPr lang="en-US"/>
+              <a:t>increased by _sbrk</a:t>
+            </a:r>
+            <a:endParaRPr lang="en-US"/>
+          </a:p>
+        </p:txBody>
+      </p:sp>
+      <p:sp>
+        <p:nvSpPr>
+          <p:cNvPr id="10" name="Text Box 9"/>
+          <p:cNvSpPr txBox="1"/>
+          <p:nvPr/>
+        </p:nvSpPr>
+        <p:spPr>
+          <a:xfrm>
+            <a:off x="5899785" y="3484880"/>
+            <a:ext cx="2044700" cy="306705"/>
+          </a:xfrm>
+          <a:prstGeom prst="rect">
+            <a:avLst/>
+          </a:prstGeom>
+          <a:noFill/>
+        </p:spPr>
+        <p:txBody>
+          <a:bodyPr wrap="square" rtlCol="0">
+            <a:spAutoFit/>
+          </a:bodyPr>
+          <a:p>
+            <a:r>
+              <a:rPr lang="en-US"/>
+              <a:t>changed by register “sp”</a:t>
+            </a:r>
+            <a:endParaRPr lang="en-US"/>
+          </a:p>
+        </p:txBody>
+      </p:sp>
+      <p:sp>
+        <p:nvSpPr>
+          <p:cNvPr id="11" name="Explosion 2 10"/>
+          <p:cNvSpPr/>
+          <p:nvPr/>
+        </p:nvSpPr>
+        <p:spPr>
+          <a:xfrm>
+            <a:off x="4047490" y="2806700"/>
+            <a:ext cx="1663700" cy="513715"/>
+          </a:xfrm>
+          <a:prstGeom prst="irregularSeal2">
+            <a:avLst/>
+          </a:prstGeom>
+          <a:gradFill>
+            <a:gsLst>
+              <a:gs pos="0">
+                <a:srgbClr val="E30000"/>
+              </a:gs>
+              <a:gs pos="100000">
+                <a:srgbClr val="760303"/>
+              </a:gs>
+            </a:gsLst>
+            <a:lin ang="5400000" scaled="0"/>
+          </a:gradFill>
+          <a:ln>
+            <a:noFill/>
+          </a:ln>
+        </p:spPr>
+        <p:style>
+          <a:lnRef idx="2">
+            <a:schemeClr val="accent1">
+              <a:shade val="50000"/>
+            </a:schemeClr>
+          </a:lnRef>
+          <a:fillRef idx="1">
+            <a:schemeClr val="accent1"/>
+          </a:fillRef>
+          <a:effectRef idx="0">
+            <a:schemeClr val="accent1"/>
+          </a:effectRef>
+          <a:fontRef idx="minor">
+            <a:schemeClr val="lt1"/>
+          </a:fontRef>
+        </p:style>
+        <p:txBody>
+          <a:bodyPr rtlCol="0" anchor="ctr"/>
+          <a:p>
+            <a:pPr algn="ctr"/>
+            <a:endParaRPr lang="en-US"/>
+          </a:p>
+        </p:txBody>
+      </p:sp>
+      <p:sp>
+        <p:nvSpPr>
+          <p:cNvPr id="13" name="Text Box 12"/>
+          <p:cNvSpPr txBox="1"/>
+          <p:nvPr/>
+        </p:nvSpPr>
+        <p:spPr>
+          <a:xfrm>
+            <a:off x="4010660" y="3484880"/>
+            <a:ext cx="1706245" cy="306705"/>
+          </a:xfrm>
+          <a:prstGeom prst="rect">
+            <a:avLst/>
+          </a:prstGeom>
+          <a:noFill/>
+        </p:spPr>
+        <p:txBody>
+          <a:bodyPr wrap="square" rtlCol="0">
+            <a:spAutoFit/>
+          </a:bodyPr>
+          <a:p>
+            <a:r>
+              <a:rPr lang="en-US"/>
+              <a:t>overlaping is bad</a:t>
+            </a:r>
+            <a:endParaRPr lang="en-US"/>
+          </a:p>
+        </p:txBody>
+      </p:sp>
     </p:spTree>
   </p:cSld>
   <p:clrMapOvr>
@@ -5522,8 +6154,8 @@
         </p:nvSpPr>
         <p:spPr>
           <a:xfrm>
-            <a:off x="721995" y="599758"/>
-            <a:ext cx="5928995" cy="430530"/>
+            <a:off x="721995" y="600075"/>
+            <a:ext cx="6409055" cy="430530"/>
           </a:xfrm>
           <a:prstGeom prst="rect">
             <a:avLst/>
@@ -5534,7 +6166,7 @@
           </a:ln>
         </p:spPr>
         <p:txBody>
-          <a:bodyPr spcFirstLastPara="1" wrap="none" lIns="0" tIns="0" rIns="0" bIns="0" anchor="ctr" anchorCtr="0">
+          <a:bodyPr spcFirstLastPara="1" wrap="square" lIns="0" tIns="0" rIns="0" bIns="0" anchor="ctr" anchorCtr="0">
             <a:spAutoFit/>
           </a:bodyPr>
           <a:p>
@@ -5558,7 +6190,7 @@
                 <a:cs typeface="Noto Sans SC Black" panose="020B0A00000000000000" charset="-122"/>
                 <a:sym typeface="Montserrat" panose="00000300000000000000"/>
               </a:rPr>
-              <a:t>Tips About Performance Profiling</a:t>
+              <a:t>Detect Heap/Stack Overlapping</a:t>
             </a:r>
             <a:endParaRPr lang="en-US" sz="2800" kern="100" spc="100">
               <a:solidFill>
@@ -5620,64 +6252,14 @@
       </p:sp>
       <p:sp>
         <p:nvSpPr>
-          <p:cNvPr id="1" name="Text Box 0"/>
-          <p:cNvSpPr txBox="1"/>
-          <p:nvPr/>
-        </p:nvSpPr>
-        <p:spPr>
-          <a:xfrm>
-            <a:off x="721995" y="1617345"/>
-            <a:ext cx="6633210" cy="953135"/>
-          </a:xfrm>
-          <a:prstGeom prst="rect">
-            <a:avLst/>
-          </a:prstGeom>
-          <a:noFill/>
-        </p:spPr>
-        <p:txBody>
-          <a:bodyPr wrap="square" rtlCol="0">
-            <a:spAutoFit/>
-          </a:bodyPr>
-          <a:p>
-            <a:pPr marL="285750" indent="-285750">
-              <a:buFont typeface="Arial" panose="020B0604020202090204" pitchFamily="34" charset="0"/>
-              <a:buChar char="•"/>
-            </a:pPr>
-            <a:r>
-              <a:rPr lang="en-US"/>
-              <a:t>Must compiled with “-g” (debug information)</a:t>
-            </a:r>
-            <a:endParaRPr lang="en-US"/>
-          </a:p>
-          <a:p>
-            <a:pPr marL="285750" indent="-285750">
-              <a:buFont typeface="Arial" panose="020B0604020202090204" pitchFamily="34" charset="0"/>
-              <a:buChar char="•"/>
-            </a:pPr>
-            <a:r>
-              <a:rPr lang="en-US"/>
-              <a:t>--replace-binary or --simple-binary must be used</a:t>
-            </a:r>
-            <a:endParaRPr lang="en-US"/>
-          </a:p>
-          <a:p>
-            <a:endParaRPr lang="en-US"/>
-          </a:p>
-          <a:p>
-            <a:endParaRPr lang="en-US"/>
-          </a:p>
-        </p:txBody>
-      </p:sp>
-      <p:sp>
-        <p:nvSpPr>
           <p:cNvPr id="2" name="Text Box 1"/>
           <p:cNvSpPr txBox="1"/>
           <p:nvPr/>
         </p:nvSpPr>
         <p:spPr>
           <a:xfrm>
-            <a:off x="821690" y="2271395"/>
-            <a:ext cx="5319395" cy="1599565"/>
+            <a:off x="828675" y="1819910"/>
+            <a:ext cx="5777230" cy="953135"/>
           </a:xfrm>
           <a:prstGeom prst="rect">
             <a:avLst/>
@@ -5708,7 +6290,7 @@
             </a:pPr>
             <a:r>
               <a:rPr lang="en-US"/>
-              <a:t>❯ make run-simple-binary-pprof</a:t>
+              <a:t>❯ make run-simple-binary-overlapping</a:t>
             </a:r>
             <a:endParaRPr lang="en-US"/>
           </a:p>
@@ -5719,7 +6301,7 @@
             </a:pPr>
             <a:r>
               <a:rPr lang="en-US"/>
-              <a:t>ckb-debugger --simple-binary build/fib --pprof=build/fib.pprof</a:t>
+              <a:t>ckb-debugger --bin  build/overlapping</a:t>
             </a:r>
             <a:endParaRPr lang="en-US"/>
           </a:p>
@@ -5730,48 +6312,36 @@
             </a:pPr>
             <a:r>
               <a:rPr lang="en-US"/>
-              <a:t>Run result: 0</a:t>
-            </a:r>
-            <a:endParaRPr lang="en-US"/>
-          </a:p>
-          <a:p>
-            <a:pPr marL="0" indent="0">
-              <a:buFont typeface="Arial" panose="020B0604020202090204" pitchFamily="34" charset="0"/>
-              <a:buNone/>
-            </a:pPr>
-            <a:r>
-              <a:rPr lang="en-US"/>
-              <a:t>Total cycles consumed: 1847</a:t>
-            </a:r>
-            <a:endParaRPr lang="en-US"/>
-          </a:p>
-          <a:p>
-            <a:pPr marL="0" indent="0">
-              <a:buFont typeface="Arial" panose="020B0604020202090204" pitchFamily="34" charset="0"/>
-              <a:buNone/>
-            </a:pPr>
-            <a:endParaRPr lang="en-US"/>
-          </a:p>
-          <a:p>
-            <a:pPr marL="0" indent="0">
-              <a:buFont typeface="Arial" panose="020B0604020202090204" pitchFamily="34" charset="0"/>
-              <a:buNone/>
-            </a:pPr>
-            <a:r>
-              <a:rPr lang="en-US"/>
-              <a:t>cat build/fib.pprof | inferno-flamegraph &gt; build/fib.svg</a:t>
-            </a:r>
-            <a:endParaRPr lang="en-US"/>
-          </a:p>
-          <a:p>
-            <a:pPr marL="0" indent="0">
-              <a:buFont typeface="Arial" panose="020B0604020202090204" pitchFamily="34" charset="0"/>
-              <a:buNone/>
-            </a:pPr>
-            <a:endParaRPr lang="en-US"/>
-          </a:p>
-        </p:txBody>
-      </p:sp>
+              <a:t>thread 'main' panicked at 'Heap and stack overlapping sp=76688 heap=76704'</a:t>
+            </a:r>
+            <a:endParaRPr lang="en-US"/>
+          </a:p>
+        </p:txBody>
+      </p:sp>
+      <p:pic>
+        <p:nvPicPr>
+          <p:cNvPr id="12" name="Picture 11"/>
+          <p:cNvPicPr>
+            <a:picLocks noChangeAspect="1"/>
+          </p:cNvPicPr>
+          <p:nvPr/>
+        </p:nvPicPr>
+        <p:blipFill>
+          <a:blip r:embed="rId1"/>
+          <a:stretch>
+            <a:fillRect/>
+          </a:stretch>
+        </p:blipFill>
+        <p:spPr>
+          <a:xfrm>
+            <a:off x="5542915" y="2773045"/>
+            <a:ext cx="1588135" cy="1790700"/>
+          </a:xfrm>
+          <a:prstGeom prst="rect">
+            <a:avLst/>
+          </a:prstGeom>
+        </p:spPr>
+      </p:pic>
     </p:spTree>
   </p:cSld>
   <p:clrMapOvr>
@@ -5806,7 +6376,7 @@
         <p:spPr>
           <a:xfrm>
             <a:off x="721995" y="599758"/>
-            <a:ext cx="6017895" cy="430530"/>
+            <a:ext cx="3877945" cy="430530"/>
           </a:xfrm>
           <a:prstGeom prst="rect">
             <a:avLst/>
@@ -5841,7 +6411,7 @@
                 <a:cs typeface="Noto Sans SC Black" panose="020B0A00000000000000" charset="-122"/>
                 <a:sym typeface="Montserrat" panose="00000300000000000000"/>
               </a:rPr>
-              <a:t>Limitation/Future Enhancedments</a:t>
+              <a:t>Performance Profiling</a:t>
             </a:r>
             <a:endParaRPr lang="en-US" sz="2800" kern="100" spc="100">
               <a:solidFill>
@@ -5909,8 +6479,8 @@
         </p:nvSpPr>
         <p:spPr>
           <a:xfrm>
-            <a:off x="789305" y="2844800"/>
-            <a:ext cx="6633210" cy="737235"/>
+            <a:off x="721995" y="1609725"/>
+            <a:ext cx="6633210" cy="1168400"/>
           </a:xfrm>
           <a:prstGeom prst="rect">
             <a:avLst/>
@@ -5928,17 +6498,9 @@
             </a:pPr>
             <a:r>
               <a:rPr lang="en-US"/>
-              <a:t>Build a tool to generate/modify </a:t>
-            </a:r>
-            <a:r>
-              <a:rPr lang="en-US">
-                <a:sym typeface="+mn-ea"/>
-              </a:rPr>
-              <a:t>mocked transaction files</a:t>
-            </a:r>
-            <a:endParaRPr lang="en-US">
-              <a:sym typeface="+mn-ea"/>
-            </a:endParaRPr>
+              <a:t>Another important feature</a:t>
+            </a:r>
+            <a:endParaRPr lang="en-US"/>
           </a:p>
           <a:p>
             <a:pPr marL="285750" indent="-285750">
@@ -5946,15 +6508,23 @@
               <a:buChar char="•"/>
             </a:pPr>
             <a:r>
-              <a:rPr lang="en-US">
-                <a:sym typeface="+mn-ea"/>
-              </a:rPr>
-              <a:t>Add dynamic tracing framework like DTrace </a:t>
-            </a:r>
-            <a:r>
               <a:rPr lang="en-US"/>
-              <a:t> </a:t>
-            </a:r>
+              <a:t>It can enabled by --pprof=&lt;output file for inferno-flamegraph&gt;</a:t>
+            </a:r>
+            <a:endParaRPr lang="en-US"/>
+          </a:p>
+          <a:p>
+            <a:pPr marL="285750" indent="-285750">
+              <a:buFont typeface="Arial" panose="020B0604020202090204" pitchFamily="34" charset="0"/>
+              <a:buChar char="•"/>
+            </a:pPr>
+            <a:endParaRPr lang="en-US"/>
+          </a:p>
+          <a:p>
+            <a:pPr marL="285750" indent="-285750">
+              <a:buFont typeface="Arial" panose="020B0604020202090204" pitchFamily="34" charset="0"/>
+              <a:buChar char="•"/>
+            </a:pPr>
             <a:endParaRPr lang="en-US"/>
           </a:p>
           <a:p>
@@ -5970,22 +6540,101 @@
         </p:nvSpPr>
         <p:spPr>
           <a:xfrm>
-            <a:off x="824865" y="1609725"/>
-            <a:ext cx="5213350" cy="521970"/>
-          </a:xfrm>
-          <a:prstGeom prst="rect">
-            <a:avLst/>
-          </a:prstGeom>
-          <a:noFill/>
+            <a:off x="821690" y="2271395"/>
+            <a:ext cx="6210935" cy="1599565"/>
+          </a:xfrm>
+          <a:prstGeom prst="rect">
+            <a:avLst/>
+          </a:prstGeom>
+          <a:solidFill>
+            <a:schemeClr val="accent4">
+              <a:lumMod val="20000"/>
+              <a:lumOff val="80000"/>
+            </a:schemeClr>
+          </a:solidFill>
+          <a:ln>
+            <a:solidFill>
+              <a:schemeClr val="accent4">
+                <a:lumMod val="20000"/>
+                <a:lumOff val="80000"/>
+              </a:schemeClr>
+            </a:solidFill>
+          </a:ln>
         </p:spPr>
         <p:txBody>
           <a:bodyPr wrap="square" rtlCol="0">
             <a:spAutoFit/>
           </a:bodyPr>
           <a:p>
+            <a:pPr marL="0" indent="0">
+              <a:buFont typeface="Arial" panose="020B0604020202090204" pitchFamily="34" charset="0"/>
+              <a:buNone/>
+            </a:pPr>
             <a:r>
               <a:rPr lang="en-US"/>
-              <a:t>Limitation: Difficult to generate altered mocked transaction files by any tool.</a:t>
+              <a:t>❯ make run-simple-binary-pprof</a:t>
+            </a:r>
+            <a:endParaRPr lang="en-US"/>
+          </a:p>
+          <a:p>
+            <a:pPr marL="0" indent="0">
+              <a:buFont typeface="Arial" panose="020B0604020202090204" pitchFamily="34" charset="0"/>
+              <a:buNone/>
+            </a:pPr>
+            <a:r>
+              <a:rPr lang="en-US"/>
+              <a:t>ckb-debugger --bin build/fib --pprof=build/fib.pprof</a:t>
+            </a:r>
+            <a:endParaRPr lang="en-US"/>
+          </a:p>
+          <a:p>
+            <a:pPr marL="0" indent="0">
+              <a:buFont typeface="Arial" panose="020B0604020202090204" pitchFamily="34" charset="0"/>
+              <a:buNone/>
+            </a:pPr>
+            <a:r>
+              <a:rPr lang="en-US"/>
+              <a:t>Run result: 0</a:t>
+            </a:r>
+            <a:endParaRPr lang="en-US"/>
+          </a:p>
+          <a:p>
+            <a:pPr marL="0" indent="0">
+              <a:buFont typeface="Arial" panose="020B0604020202090204" pitchFamily="34" charset="0"/>
+              <a:buNone/>
+            </a:pPr>
+            <a:r>
+              <a:rPr lang="en-US"/>
+              <a:t>Total cycles consumed: 4499</a:t>
+            </a:r>
+            <a:endParaRPr lang="en-US"/>
+          </a:p>
+          <a:p>
+            <a:pPr marL="0" indent="0">
+              <a:buFont typeface="Arial" panose="020B0604020202090204" pitchFamily="34" charset="0"/>
+              <a:buNone/>
+            </a:pPr>
+            <a:r>
+              <a:rPr lang="en-US"/>
+              <a:t>Transfer cycles: 2652, running cycles: 1847</a:t>
+            </a:r>
+            <a:endParaRPr lang="en-US"/>
+          </a:p>
+          <a:p>
+            <a:pPr marL="0" indent="0">
+              <a:buFont typeface="Arial" panose="020B0604020202090204" pitchFamily="34" charset="0"/>
+              <a:buNone/>
+            </a:pPr>
+            <a:endParaRPr lang="en-US"/>
+          </a:p>
+          <a:p>
+            <a:pPr marL="0" indent="0">
+              <a:buFont typeface="Arial" panose="020B0604020202090204" pitchFamily="34" charset="0"/>
+              <a:buNone/>
+            </a:pPr>
+            <a:r>
+              <a:rPr lang="en-US"/>
+              <a:t>cat build/fib.pprof | inferno-flamegraph &gt; build/fib.svg</a:t>
             </a:r>
             <a:endParaRPr lang="en-US"/>
           </a:p>
@@ -6004,7 +6653,7 @@
   <p:cSld>
     <p:spTree>
       <p:nvGrpSpPr>
-        <p:cNvPr id="64" name="Shape 64"/>
+        <p:cNvPr id="49" name="Shape 49"/>
         <p:cNvGrpSpPr/>
         <p:nvPr/>
       </p:nvGrpSpPr>
@@ -6018,14 +6667,14 @@
       </p:grpSpPr>
       <p:sp>
         <p:nvSpPr>
-          <p:cNvPr id="65" name="Google Shape;65;p11"/>
+          <p:cNvPr id="40" name="Google Shape;40;p9"/>
           <p:cNvSpPr txBox="1"/>
           <p:nvPr/>
         </p:nvSpPr>
         <p:spPr>
           <a:xfrm>
-            <a:off x="1445815" y="1020875"/>
-            <a:ext cx="6213000" cy="1331400"/>
+            <a:off x="721995" y="599758"/>
+            <a:ext cx="2191385" cy="430530"/>
           </a:xfrm>
           <a:prstGeom prst="rect">
             <a:avLst/>
@@ -6036,12 +6685,70 @@
           </a:ln>
         </p:spPr>
         <p:txBody>
+          <a:bodyPr spcFirstLastPara="1" wrap="none" lIns="0" tIns="0" rIns="0" bIns="0" anchor="ctr" anchorCtr="0">
+            <a:spAutoFit/>
+          </a:bodyPr>
+          <a:p>
+            <a:pPr marL="0" lvl="0" indent="0" algn="l" rtl="0" fontAlgn="t">
+              <a:spcBef>
+                <a:spcPts val="0"/>
+              </a:spcBef>
+              <a:spcAft>
+                <a:spcPts val="0"/>
+              </a:spcAft>
+              <a:buNone/>
+            </a:pPr>
+            <a:r>
+              <a:rPr lang="en-US" sz="2800" kern="100" spc="100">
+                <a:solidFill>
+                  <a:srgbClr val="EF190F"/>
+                </a:solidFill>
+                <a:uFillTx/>
+                <a:latin typeface="Noto Sans SC Black" panose="020B0A00000000000000" charset="-122"/>
+                <a:ea typeface="Montserrat" panose="00000300000000000000"/>
+                <a:cs typeface="Noto Sans SC Black" panose="020B0A00000000000000" charset="-122"/>
+                <a:sym typeface="Montserrat" panose="00000300000000000000"/>
+              </a:rPr>
+              <a:t>Flamegraph </a:t>
+            </a:r>
+            <a:endParaRPr lang="en-US" sz="2800" kern="100" spc="100">
+              <a:solidFill>
+                <a:srgbClr val="EF190F"/>
+              </a:solidFill>
+              <a:uFillTx/>
+              <a:latin typeface="Noto Sans SC Black" panose="020B0A00000000000000" charset="-122"/>
+              <a:ea typeface="Montserrat" panose="00000300000000000000"/>
+              <a:cs typeface="Noto Sans SC Black" panose="020B0A00000000000000" charset="-122"/>
+              <a:sym typeface="Montserrat" panose="00000300000000000000"/>
+            </a:endParaRPr>
+          </a:p>
+        </p:txBody>
+      </p:sp>
+      <p:sp>
+        <p:nvSpPr>
+          <p:cNvPr id="39" name="Google Shape;39;p9"/>
+          <p:cNvSpPr txBox="1"/>
+          <p:nvPr/>
+        </p:nvSpPr>
+        <p:spPr>
+          <a:xfrm>
+            <a:off x="8430975" y="4561225"/>
+            <a:ext cx="630900" cy="521700"/>
+          </a:xfrm>
+          <a:prstGeom prst="rect">
+            <a:avLst/>
+          </a:prstGeom>
+          <a:noFill/>
+          <a:ln>
+            <a:noFill/>
+          </a:ln>
+        </p:spPr>
+        <p:txBody>
           <a:bodyPr spcFirstLastPara="1" wrap="square" lIns="91425" tIns="91425" rIns="91425" bIns="91425" anchor="t" anchorCtr="0">
             <a:noAutofit/>
           </a:bodyPr>
-          <a:lstStyle/>
-          <a:p>
-            <a:pPr marL="0" lvl="0" indent="0" algn="r" rtl="0">
+          <a:p>
+            <a:pPr marL="0" lvl="0" indent="0" algn="l" rtl="0">
               <a:spcBef>
                 <a:spcPts val="0"/>
               </a:spcBef>
@@ -6050,46 +6757,179 @@
               </a:spcAft>
               <a:buNone/>
             </a:pPr>
-            <a:r>
-              <a:rPr lang="zh-CN" sz="8000">
-                <a:solidFill>
-                  <a:srgbClr val="FFFFFF"/>
-                </a:solidFill>
-                <a:latin typeface="Noto Sans SC Black" panose="020B0A00000000000000" charset="-122"/>
-                <a:ea typeface="Noto Sans SC Black" panose="020B0A00000000000000" charset="-122"/>
-                <a:cs typeface="Montserrat" panose="00000300000000000000"/>
-                <a:sym typeface="Montserrat" panose="00000300000000000000"/>
-              </a:rPr>
-              <a:t>THANKS</a:t>
-            </a:r>
-            <a:endParaRPr sz="8000">
+            <a:endParaRPr lang="en-US" sz="2700" b="1">
               <a:solidFill>
-                <a:srgbClr val="FFFFFF"/>
+                <a:srgbClr val="B7B7B7"/>
               </a:solidFill>
-              <a:latin typeface="Noto Sans SC Black" panose="020B0A00000000000000" charset="-122"/>
-              <a:ea typeface="Noto Sans SC Black" panose="020B0A00000000000000" charset="-122"/>
-              <a:cs typeface="Montserrat" panose="00000300000000000000"/>
+              <a:latin typeface="Montserrat Bold" panose="00000300000000000000" charset="0"/>
+              <a:ea typeface="Noto Sans SC Bold" panose="020B0800000000000000" charset="-122"/>
+              <a:cs typeface="Montserrat Bold" panose="00000300000000000000" charset="0"/>
               <a:sym typeface="Montserrat" panose="00000300000000000000"/>
             </a:endParaRPr>
           </a:p>
         </p:txBody>
       </p:sp>
+      <p:sp>
+        <p:nvSpPr>
+          <p:cNvPr id="1" name="Text Box 0"/>
+          <p:cNvSpPr txBox="1"/>
+          <p:nvPr/>
+        </p:nvSpPr>
+        <p:spPr>
+          <a:xfrm>
+            <a:off x="721995" y="1609725"/>
+            <a:ext cx="6633210" cy="1383665"/>
+          </a:xfrm>
+          <a:prstGeom prst="rect">
+            <a:avLst/>
+          </a:prstGeom>
+          <a:noFill/>
+        </p:spPr>
+        <p:txBody>
+          <a:bodyPr wrap="square" rtlCol="0">
+            <a:spAutoFit/>
+          </a:bodyPr>
+          <a:p>
+            <a:pPr marL="285750" indent="-285750">
+              <a:buFont typeface="Arial" panose="020B0604020202090204" pitchFamily="34" charset="0"/>
+              <a:buChar char="•"/>
+            </a:pPr>
+            <a:r>
+              <a:rPr lang="en-US"/>
+              <a:t>We use </a:t>
+            </a:r>
+            <a:r>
+              <a:rPr lang="en-US">
+                <a:hlinkClick r:id="rId1" action="ppaction://hlinkfile"/>
+              </a:rPr>
+              <a:t>inferno-flamegraph</a:t>
+            </a:r>
+            <a:endParaRPr lang="en-US">
+              <a:hlinkClick r:id="rId1" action="ppaction://hlinkfile"/>
+            </a:endParaRPr>
+          </a:p>
+          <a:p>
+            <a:pPr marL="285750" indent="-285750">
+              <a:buFont typeface="Arial" panose="020B0604020202090204" pitchFamily="34" charset="0"/>
+              <a:buChar char="•"/>
+            </a:pPr>
+            <a:endParaRPr lang="en-US">
+              <a:hlinkClick r:id="rId1" action="ppaction://hlinkfile"/>
+            </a:endParaRPr>
+          </a:p>
+          <a:p>
+            <a:pPr marL="285750" indent="-285750">
+              <a:buFont typeface="Arial" panose="020B0604020202090204" pitchFamily="34" charset="0"/>
+              <a:buChar char="•"/>
+            </a:pPr>
+            <a:endParaRPr lang="en-US">
+              <a:hlinkClick r:id="rId1" action="ppaction://hlinkfile"/>
+            </a:endParaRPr>
+          </a:p>
+          <a:p>
+            <a:pPr marL="285750" indent="-285750">
+              <a:buFont typeface="Arial" panose="020B0604020202090204" pitchFamily="34" charset="0"/>
+              <a:buChar char="•"/>
+            </a:pPr>
+            <a:endParaRPr lang="en-US">
+              <a:hlinkClick r:id="rId1" action="ppaction://hlinkfile"/>
+            </a:endParaRPr>
+          </a:p>
+          <a:p>
+            <a:pPr marL="285750" indent="-285750">
+              <a:buFont typeface="Arial" panose="020B0604020202090204" pitchFamily="34" charset="0"/>
+              <a:buChar char="•"/>
+            </a:pPr>
+            <a:endParaRPr lang="en-US"/>
+          </a:p>
+          <a:p>
+            <a:endParaRPr lang="en-US"/>
+          </a:p>
+        </p:txBody>
+      </p:sp>
       <p:pic>
         <p:nvPicPr>
-          <p:cNvPr id="66" name="Google Shape;66;p11"/>
-          <p:cNvPicPr preferRelativeResize="0"/>
+          <p:cNvPr id="3" name="Picture 2"/>
+          <p:cNvPicPr>
+            <a:picLocks noChangeAspect="1"/>
+          </p:cNvPicPr>
           <p:nvPr/>
         </p:nvPicPr>
         <p:blipFill>
-          <a:blip r:embed="rId1"/>
+          <a:blip r:embed="rId2"/>
           <a:stretch>
             <a:fillRect/>
           </a:stretch>
         </p:blipFill>
         <p:spPr>
           <a:xfrm>
-            <a:off x="5825475" y="4238275"/>
-            <a:ext cx="1691700" cy="486525"/>
+            <a:off x="6037580" y="600075"/>
+            <a:ext cx="2649220" cy="1695450"/>
+          </a:xfrm>
+          <a:prstGeom prst="rect">
+            <a:avLst/>
+          </a:prstGeom>
+        </p:spPr>
+      </p:pic>
+      <p:pic>
+        <p:nvPicPr>
+          <p:cNvPr id="4" name="Picture 3"/>
+          <p:cNvPicPr>
+            <a:picLocks noChangeAspect="1"/>
+          </p:cNvPicPr>
+          <p:nvPr/>
+        </p:nvPicPr>
+        <p:blipFill>
+          <a:blip r:embed="rId3"/>
+          <a:stretch>
+            <a:fillRect/>
+          </a:stretch>
+        </p:blipFill>
+        <p:spPr>
+          <a:xfrm>
+            <a:off x="721995" y="2435860"/>
+            <a:ext cx="8014335" cy="2339340"/>
+          </a:xfrm>
+          <a:prstGeom prst="rect">
+            <a:avLst/>
+          </a:prstGeom>
+        </p:spPr>
+      </p:pic>
+    </p:spTree>
+  </p:cSld>
+  <p:clrMapOvr>
+    <a:masterClrMapping/>
+  </p:clrMapOvr>
+</p:sld>
+</file>
+
+<file path=ppt/slides/slide19.xml><?xml version="1.0" encoding="utf-8"?>
+<p:sld xmlns:a="http://schemas.openxmlformats.org/drawingml/2006/main" xmlns:r="http://schemas.openxmlformats.org/officeDocument/2006/relationships" xmlns:p="http://schemas.openxmlformats.org/presentationml/2006/main">
+  <p:cSld>
+    <p:spTree>
+      <p:nvGrpSpPr>
+        <p:cNvPr id="49" name="Shape 49"/>
+        <p:cNvGrpSpPr/>
+        <p:nvPr/>
+      </p:nvGrpSpPr>
+      <p:grpSpPr>
+        <a:xfrm>
+          <a:off x="0" y="0"/>
+          <a:ext cx="0" cy="0"/>
+          <a:chOff x="0" y="0"/>
+          <a:chExt cx="0" cy="0"/>
+        </a:xfrm>
+      </p:grpSpPr>
+      <p:sp>
+        <p:nvSpPr>
+          <p:cNvPr id="40" name="Google Shape;40;p9"/>
+          <p:cNvSpPr txBox="1"/>
+          <p:nvPr/>
+        </p:nvSpPr>
+        <p:spPr>
+          <a:xfrm>
+            <a:off x="721995" y="599758"/>
+            <a:ext cx="5928995" cy="430530"/>
           </a:xfrm>
           <a:prstGeom prst="rect">
             <a:avLst/>
@@ -6099,7 +6939,249 @@
             <a:noFill/>
           </a:ln>
         </p:spPr>
-      </p:pic>
+        <p:txBody>
+          <a:bodyPr spcFirstLastPara="1" wrap="none" lIns="0" tIns="0" rIns="0" bIns="0" anchor="ctr" anchorCtr="0">
+            <a:spAutoFit/>
+          </a:bodyPr>
+          <a:p>
+            <a:pPr marL="0" lvl="0" indent="0" algn="l" rtl="0" fontAlgn="t">
+              <a:spcBef>
+                <a:spcPts val="0"/>
+              </a:spcBef>
+              <a:spcAft>
+                <a:spcPts val="0"/>
+              </a:spcAft>
+              <a:buNone/>
+            </a:pPr>
+            <a:r>
+              <a:rPr lang="en-US" sz="2800" kern="100" spc="100">
+                <a:solidFill>
+                  <a:srgbClr val="EF190F"/>
+                </a:solidFill>
+                <a:uFillTx/>
+                <a:latin typeface="Noto Sans SC Black" panose="020B0A00000000000000" charset="-122"/>
+                <a:ea typeface="Montserrat" panose="00000300000000000000"/>
+                <a:cs typeface="Noto Sans SC Black" panose="020B0A00000000000000" charset="-122"/>
+                <a:sym typeface="Montserrat" panose="00000300000000000000"/>
+              </a:rPr>
+              <a:t>Tips About Performance Profiling</a:t>
+            </a:r>
+            <a:endParaRPr lang="en-US" sz="2800" kern="100" spc="100">
+              <a:solidFill>
+                <a:srgbClr val="EF190F"/>
+              </a:solidFill>
+              <a:uFillTx/>
+              <a:latin typeface="Noto Sans SC Black" panose="020B0A00000000000000" charset="-122"/>
+              <a:ea typeface="Montserrat" panose="00000300000000000000"/>
+              <a:cs typeface="Noto Sans SC Black" panose="020B0A00000000000000" charset="-122"/>
+              <a:sym typeface="Montserrat" panose="00000300000000000000"/>
+            </a:endParaRPr>
+          </a:p>
+        </p:txBody>
+      </p:sp>
+      <p:sp>
+        <p:nvSpPr>
+          <p:cNvPr id="39" name="Google Shape;39;p9"/>
+          <p:cNvSpPr txBox="1"/>
+          <p:nvPr/>
+        </p:nvSpPr>
+        <p:spPr>
+          <a:xfrm>
+            <a:off x="8430975" y="4561225"/>
+            <a:ext cx="630900" cy="521700"/>
+          </a:xfrm>
+          <a:prstGeom prst="rect">
+            <a:avLst/>
+          </a:prstGeom>
+          <a:noFill/>
+          <a:ln>
+            <a:noFill/>
+          </a:ln>
+        </p:spPr>
+        <p:txBody>
+          <a:bodyPr spcFirstLastPara="1" wrap="square" lIns="91425" tIns="91425" rIns="91425" bIns="91425" anchor="t" anchorCtr="0">
+            <a:noAutofit/>
+          </a:bodyPr>
+          <a:p>
+            <a:pPr marL="0" lvl="0" indent="0" algn="l" rtl="0">
+              <a:spcBef>
+                <a:spcPts val="0"/>
+              </a:spcBef>
+              <a:spcAft>
+                <a:spcPts val="0"/>
+              </a:spcAft>
+              <a:buNone/>
+            </a:pPr>
+            <a:endParaRPr lang="en-US" sz="2700" b="1">
+              <a:solidFill>
+                <a:srgbClr val="B7B7B7"/>
+              </a:solidFill>
+              <a:latin typeface="Montserrat Bold" panose="00000300000000000000" charset="0"/>
+              <a:ea typeface="Noto Sans SC Bold" panose="020B0800000000000000" charset="-122"/>
+              <a:cs typeface="Montserrat Bold" panose="00000300000000000000" charset="0"/>
+              <a:sym typeface="Montserrat" panose="00000300000000000000"/>
+            </a:endParaRPr>
+          </a:p>
+        </p:txBody>
+      </p:sp>
+      <p:sp>
+        <p:nvSpPr>
+          <p:cNvPr id="1" name="Text Box 0"/>
+          <p:cNvSpPr txBox="1"/>
+          <p:nvPr/>
+        </p:nvSpPr>
+        <p:spPr>
+          <a:xfrm>
+            <a:off x="721995" y="1617345"/>
+            <a:ext cx="6633210" cy="953135"/>
+          </a:xfrm>
+          <a:prstGeom prst="rect">
+            <a:avLst/>
+          </a:prstGeom>
+          <a:noFill/>
+        </p:spPr>
+        <p:txBody>
+          <a:bodyPr wrap="square" rtlCol="0">
+            <a:spAutoFit/>
+          </a:bodyPr>
+          <a:p>
+            <a:pPr marL="285750" indent="-285750">
+              <a:buFont typeface="Arial" panose="020B0604020202090204" pitchFamily="34" charset="0"/>
+              <a:buChar char="•"/>
+            </a:pPr>
+            <a:r>
+              <a:rPr lang="en-US"/>
+              <a:t>Must compiled with “-g” (debug information)</a:t>
+            </a:r>
+            <a:endParaRPr lang="en-US"/>
+          </a:p>
+          <a:p>
+            <a:pPr marL="285750" indent="-285750">
+              <a:buFont typeface="Arial" panose="020B0604020202090204" pitchFamily="34" charset="0"/>
+              <a:buChar char="•"/>
+            </a:pPr>
+            <a:r>
+              <a:rPr lang="en-US"/>
+              <a:t>--bin must be used</a:t>
+            </a:r>
+            <a:endParaRPr lang="en-US"/>
+          </a:p>
+          <a:p>
+            <a:endParaRPr lang="en-US"/>
+          </a:p>
+          <a:p>
+            <a:endParaRPr lang="en-US"/>
+          </a:p>
+        </p:txBody>
+      </p:sp>
+      <p:sp>
+        <p:nvSpPr>
+          <p:cNvPr id="3" name="Text Box 2"/>
+          <p:cNvSpPr txBox="1"/>
+          <p:nvPr/>
+        </p:nvSpPr>
+        <p:spPr>
+          <a:xfrm>
+            <a:off x="821690" y="2271395"/>
+            <a:ext cx="6210935" cy="1599565"/>
+          </a:xfrm>
+          <a:prstGeom prst="rect">
+            <a:avLst/>
+          </a:prstGeom>
+          <a:solidFill>
+            <a:schemeClr val="accent4">
+              <a:lumMod val="20000"/>
+              <a:lumOff val="80000"/>
+            </a:schemeClr>
+          </a:solidFill>
+          <a:ln>
+            <a:solidFill>
+              <a:schemeClr val="accent4">
+                <a:lumMod val="20000"/>
+                <a:lumOff val="80000"/>
+              </a:schemeClr>
+            </a:solidFill>
+          </a:ln>
+        </p:spPr>
+        <p:txBody>
+          <a:bodyPr wrap="square" rtlCol="0">
+            <a:spAutoFit/>
+          </a:bodyPr>
+          <a:p>
+            <a:pPr marL="0" indent="0">
+              <a:buFont typeface="Arial" panose="020B0604020202090204" pitchFamily="34" charset="0"/>
+              <a:buNone/>
+            </a:pPr>
+            <a:r>
+              <a:rPr lang="en-US"/>
+              <a:t>❯ make run-simple-binary-pprof</a:t>
+            </a:r>
+            <a:endParaRPr lang="en-US"/>
+          </a:p>
+          <a:p>
+            <a:pPr marL="0" indent="0">
+              <a:buFont typeface="Arial" panose="020B0604020202090204" pitchFamily="34" charset="0"/>
+              <a:buNone/>
+            </a:pPr>
+            <a:r>
+              <a:rPr lang="en-US"/>
+              <a:t>ckb-debugger --bin build/fib --pprof=build/fib.pprof</a:t>
+            </a:r>
+            <a:endParaRPr lang="en-US"/>
+          </a:p>
+          <a:p>
+            <a:pPr marL="0" indent="0">
+              <a:buFont typeface="Arial" panose="020B0604020202090204" pitchFamily="34" charset="0"/>
+              <a:buNone/>
+            </a:pPr>
+            <a:r>
+              <a:rPr lang="en-US"/>
+              <a:t>Run result: 0</a:t>
+            </a:r>
+            <a:endParaRPr lang="en-US"/>
+          </a:p>
+          <a:p>
+            <a:pPr marL="0" indent="0">
+              <a:buFont typeface="Arial" panose="020B0604020202090204" pitchFamily="34" charset="0"/>
+              <a:buNone/>
+            </a:pPr>
+            <a:r>
+              <a:rPr lang="en-US"/>
+              <a:t>Total cycles consumed: 4499</a:t>
+            </a:r>
+            <a:endParaRPr lang="en-US"/>
+          </a:p>
+          <a:p>
+            <a:pPr marL="0" indent="0">
+              <a:buFont typeface="Arial" panose="020B0604020202090204" pitchFamily="34" charset="0"/>
+              <a:buNone/>
+            </a:pPr>
+            <a:r>
+              <a:rPr lang="en-US"/>
+              <a:t>Transfer cycles: 2652, running cycles: 1847</a:t>
+            </a:r>
+            <a:endParaRPr lang="en-US"/>
+          </a:p>
+          <a:p>
+            <a:pPr marL="0" indent="0">
+              <a:buFont typeface="Arial" panose="020B0604020202090204" pitchFamily="34" charset="0"/>
+              <a:buNone/>
+            </a:pPr>
+            <a:endParaRPr lang="en-US"/>
+          </a:p>
+          <a:p>
+            <a:pPr marL="0" indent="0">
+              <a:buFont typeface="Arial" panose="020B0604020202090204" pitchFamily="34" charset="0"/>
+              <a:buNone/>
+            </a:pPr>
+            <a:r>
+              <a:rPr lang="en-US"/>
+              <a:t>cat build/fib.pprof | inferno-flamegraph &gt; build/fib.svg</a:t>
+            </a:r>
+            <a:endParaRPr lang="en-US"/>
+          </a:p>
+        </p:txBody>
+      </p:sp>
     </p:spTree>
   </p:cSld>
   <p:clrMapOvr>
@@ -6334,6 +7416,334 @@
           </a:p>
         </p:txBody>
       </p:sp>
+    </p:spTree>
+  </p:cSld>
+  <p:clrMapOvr>
+    <a:masterClrMapping/>
+  </p:clrMapOvr>
+</p:sld>
+</file>
+
+<file path=ppt/slides/slide20.xml><?xml version="1.0" encoding="utf-8"?>
+<p:sld xmlns:a="http://schemas.openxmlformats.org/drawingml/2006/main" xmlns:r="http://schemas.openxmlformats.org/officeDocument/2006/relationships" xmlns:p="http://schemas.openxmlformats.org/presentationml/2006/main">
+  <p:cSld>
+    <p:spTree>
+      <p:nvGrpSpPr>
+        <p:cNvPr id="49" name="Shape 49"/>
+        <p:cNvGrpSpPr/>
+        <p:nvPr/>
+      </p:nvGrpSpPr>
+      <p:grpSpPr>
+        <a:xfrm>
+          <a:off x="0" y="0"/>
+          <a:ext cx="0" cy="0"/>
+          <a:chOff x="0" y="0"/>
+          <a:chExt cx="0" cy="0"/>
+        </a:xfrm>
+      </p:grpSpPr>
+      <p:sp>
+        <p:nvSpPr>
+          <p:cNvPr id="40" name="Google Shape;40;p9"/>
+          <p:cNvSpPr txBox="1"/>
+          <p:nvPr/>
+        </p:nvSpPr>
+        <p:spPr>
+          <a:xfrm>
+            <a:off x="721995" y="599758"/>
+            <a:ext cx="6017895" cy="430530"/>
+          </a:xfrm>
+          <a:prstGeom prst="rect">
+            <a:avLst/>
+          </a:prstGeom>
+          <a:noFill/>
+          <a:ln>
+            <a:noFill/>
+          </a:ln>
+        </p:spPr>
+        <p:txBody>
+          <a:bodyPr spcFirstLastPara="1" wrap="none" lIns="0" tIns="0" rIns="0" bIns="0" anchor="ctr" anchorCtr="0">
+            <a:spAutoFit/>
+          </a:bodyPr>
+          <a:p>
+            <a:pPr marL="0" lvl="0" indent="0" algn="l" rtl="0" fontAlgn="t">
+              <a:spcBef>
+                <a:spcPts val="0"/>
+              </a:spcBef>
+              <a:spcAft>
+                <a:spcPts val="0"/>
+              </a:spcAft>
+              <a:buNone/>
+            </a:pPr>
+            <a:r>
+              <a:rPr lang="en-US" sz="2800" kern="100" spc="100">
+                <a:solidFill>
+                  <a:srgbClr val="EF190F"/>
+                </a:solidFill>
+                <a:uFillTx/>
+                <a:latin typeface="Noto Sans SC Black" panose="020B0A00000000000000" charset="-122"/>
+                <a:ea typeface="Montserrat" panose="00000300000000000000"/>
+                <a:cs typeface="Noto Sans SC Black" panose="020B0A00000000000000" charset="-122"/>
+                <a:sym typeface="Montserrat" panose="00000300000000000000"/>
+              </a:rPr>
+              <a:t>Limitation/Future Enhancedments</a:t>
+            </a:r>
+            <a:endParaRPr lang="en-US" sz="2800" kern="100" spc="100">
+              <a:solidFill>
+                <a:srgbClr val="EF190F"/>
+              </a:solidFill>
+              <a:uFillTx/>
+              <a:latin typeface="Noto Sans SC Black" panose="020B0A00000000000000" charset="-122"/>
+              <a:ea typeface="Montserrat" panose="00000300000000000000"/>
+              <a:cs typeface="Noto Sans SC Black" panose="020B0A00000000000000" charset="-122"/>
+              <a:sym typeface="Montserrat" panose="00000300000000000000"/>
+            </a:endParaRPr>
+          </a:p>
+        </p:txBody>
+      </p:sp>
+      <p:sp>
+        <p:nvSpPr>
+          <p:cNvPr id="39" name="Google Shape;39;p9"/>
+          <p:cNvSpPr txBox="1"/>
+          <p:nvPr/>
+        </p:nvSpPr>
+        <p:spPr>
+          <a:xfrm>
+            <a:off x="8430975" y="4561225"/>
+            <a:ext cx="630900" cy="521700"/>
+          </a:xfrm>
+          <a:prstGeom prst="rect">
+            <a:avLst/>
+          </a:prstGeom>
+          <a:noFill/>
+          <a:ln>
+            <a:noFill/>
+          </a:ln>
+        </p:spPr>
+        <p:txBody>
+          <a:bodyPr spcFirstLastPara="1" wrap="square" lIns="91425" tIns="91425" rIns="91425" bIns="91425" anchor="t" anchorCtr="0">
+            <a:noAutofit/>
+          </a:bodyPr>
+          <a:p>
+            <a:pPr marL="0" lvl="0" indent="0" algn="l" rtl="0">
+              <a:spcBef>
+                <a:spcPts val="0"/>
+              </a:spcBef>
+              <a:spcAft>
+                <a:spcPts val="0"/>
+              </a:spcAft>
+              <a:buNone/>
+            </a:pPr>
+            <a:endParaRPr lang="en-US" sz="2700" b="1">
+              <a:solidFill>
+                <a:srgbClr val="B7B7B7"/>
+              </a:solidFill>
+              <a:latin typeface="Montserrat Bold" panose="00000300000000000000" charset="0"/>
+              <a:ea typeface="Noto Sans SC Bold" panose="020B0800000000000000" charset="-122"/>
+              <a:cs typeface="Montserrat Bold" panose="00000300000000000000" charset="0"/>
+              <a:sym typeface="Montserrat" panose="00000300000000000000"/>
+            </a:endParaRPr>
+          </a:p>
+        </p:txBody>
+      </p:sp>
+      <p:sp>
+        <p:nvSpPr>
+          <p:cNvPr id="1" name="Text Box 0"/>
+          <p:cNvSpPr txBox="1"/>
+          <p:nvPr/>
+        </p:nvSpPr>
+        <p:spPr>
+          <a:xfrm>
+            <a:off x="789305" y="2844800"/>
+            <a:ext cx="6633210" cy="737235"/>
+          </a:xfrm>
+          <a:prstGeom prst="rect">
+            <a:avLst/>
+          </a:prstGeom>
+          <a:noFill/>
+        </p:spPr>
+        <p:txBody>
+          <a:bodyPr wrap="square" rtlCol="0">
+            <a:spAutoFit/>
+          </a:bodyPr>
+          <a:p>
+            <a:pPr marL="285750" indent="-285750">
+              <a:buFont typeface="Arial" panose="020B0604020202090204" pitchFamily="34" charset="0"/>
+              <a:buChar char="•"/>
+            </a:pPr>
+            <a:r>
+              <a:rPr lang="en-US"/>
+              <a:t>Build a tool to generate/modify </a:t>
+            </a:r>
+            <a:r>
+              <a:rPr lang="en-US">
+                <a:sym typeface="+mn-ea"/>
+              </a:rPr>
+              <a:t>mocked transaction files</a:t>
+            </a:r>
+            <a:endParaRPr lang="en-US">
+              <a:sym typeface="+mn-ea"/>
+            </a:endParaRPr>
+          </a:p>
+          <a:p>
+            <a:pPr marL="285750" indent="-285750">
+              <a:buFont typeface="Arial" panose="020B0604020202090204" pitchFamily="34" charset="0"/>
+              <a:buChar char="•"/>
+            </a:pPr>
+            <a:r>
+              <a:rPr lang="en-US">
+                <a:sym typeface="+mn-ea"/>
+              </a:rPr>
+              <a:t>Add dynamic tracing framework like DTrace </a:t>
+            </a:r>
+            <a:r>
+              <a:rPr lang="en-US"/>
+              <a:t> </a:t>
+            </a:r>
+            <a:endParaRPr lang="en-US"/>
+          </a:p>
+          <a:p>
+            <a:endParaRPr lang="en-US"/>
+          </a:p>
+        </p:txBody>
+      </p:sp>
+      <p:sp>
+        <p:nvSpPr>
+          <p:cNvPr id="2" name="Text Box 1"/>
+          <p:cNvSpPr txBox="1"/>
+          <p:nvPr/>
+        </p:nvSpPr>
+        <p:spPr>
+          <a:xfrm>
+            <a:off x="824865" y="1609725"/>
+            <a:ext cx="5213350" cy="521970"/>
+          </a:xfrm>
+          <a:prstGeom prst="rect">
+            <a:avLst/>
+          </a:prstGeom>
+          <a:noFill/>
+        </p:spPr>
+        <p:txBody>
+          <a:bodyPr wrap="square" rtlCol="0">
+            <a:spAutoFit/>
+          </a:bodyPr>
+          <a:p>
+            <a:r>
+              <a:rPr lang="en-US"/>
+              <a:t>Limitation: Difficult to generate altered mocked transaction files by any tool.</a:t>
+            </a:r>
+            <a:endParaRPr lang="en-US"/>
+          </a:p>
+        </p:txBody>
+      </p:sp>
+    </p:spTree>
+  </p:cSld>
+  <p:clrMapOvr>
+    <a:masterClrMapping/>
+  </p:clrMapOvr>
+</p:sld>
+</file>
+
+<file path=ppt/slides/slide21.xml><?xml version="1.0" encoding="utf-8"?>
+<p:sld xmlns:a="http://schemas.openxmlformats.org/drawingml/2006/main" xmlns:r="http://schemas.openxmlformats.org/officeDocument/2006/relationships" xmlns:p="http://schemas.openxmlformats.org/presentationml/2006/main">
+  <p:cSld>
+    <p:spTree>
+      <p:nvGrpSpPr>
+        <p:cNvPr id="64" name="Shape 64"/>
+        <p:cNvGrpSpPr/>
+        <p:nvPr/>
+      </p:nvGrpSpPr>
+      <p:grpSpPr>
+        <a:xfrm>
+          <a:off x="0" y="0"/>
+          <a:ext cx="0" cy="0"/>
+          <a:chOff x="0" y="0"/>
+          <a:chExt cx="0" cy="0"/>
+        </a:xfrm>
+      </p:grpSpPr>
+      <p:sp>
+        <p:nvSpPr>
+          <p:cNvPr id="65" name="Google Shape;65;p11"/>
+          <p:cNvSpPr txBox="1"/>
+          <p:nvPr/>
+        </p:nvSpPr>
+        <p:spPr>
+          <a:xfrm>
+            <a:off x="1445815" y="1020875"/>
+            <a:ext cx="6213000" cy="1331400"/>
+          </a:xfrm>
+          <a:prstGeom prst="rect">
+            <a:avLst/>
+          </a:prstGeom>
+          <a:noFill/>
+          <a:ln>
+            <a:noFill/>
+          </a:ln>
+        </p:spPr>
+        <p:txBody>
+          <a:bodyPr spcFirstLastPara="1" wrap="square" lIns="91425" tIns="91425" rIns="91425" bIns="91425" anchor="t" anchorCtr="0">
+            <a:noAutofit/>
+          </a:bodyPr>
+          <a:lstStyle/>
+          <a:p>
+            <a:pPr marL="0" lvl="0" indent="0" algn="r" rtl="0">
+              <a:spcBef>
+                <a:spcPts val="0"/>
+              </a:spcBef>
+              <a:spcAft>
+                <a:spcPts val="0"/>
+              </a:spcAft>
+              <a:buNone/>
+            </a:pPr>
+            <a:r>
+              <a:rPr lang="zh-CN" sz="8000">
+                <a:solidFill>
+                  <a:srgbClr val="FFFFFF"/>
+                </a:solidFill>
+                <a:latin typeface="Noto Sans SC Black" panose="020B0A00000000000000" charset="-122"/>
+                <a:ea typeface="Noto Sans SC Black" panose="020B0A00000000000000" charset="-122"/>
+                <a:cs typeface="Montserrat" panose="00000300000000000000"/>
+                <a:sym typeface="Montserrat" panose="00000300000000000000"/>
+              </a:rPr>
+              <a:t>THANKS</a:t>
+            </a:r>
+            <a:endParaRPr sz="8000">
+              <a:solidFill>
+                <a:srgbClr val="FFFFFF"/>
+              </a:solidFill>
+              <a:latin typeface="Noto Sans SC Black" panose="020B0A00000000000000" charset="-122"/>
+              <a:ea typeface="Noto Sans SC Black" panose="020B0A00000000000000" charset="-122"/>
+              <a:cs typeface="Montserrat" panose="00000300000000000000"/>
+              <a:sym typeface="Montserrat" panose="00000300000000000000"/>
+            </a:endParaRPr>
+          </a:p>
+        </p:txBody>
+      </p:sp>
+      <p:pic>
+        <p:nvPicPr>
+          <p:cNvPr id="66" name="Google Shape;66;p11"/>
+          <p:cNvPicPr preferRelativeResize="0"/>
+          <p:nvPr/>
+        </p:nvPicPr>
+        <p:blipFill>
+          <a:blip r:embed="rId1"/>
+          <a:stretch>
+            <a:fillRect/>
+          </a:stretch>
+        </p:blipFill>
+        <p:spPr>
+          <a:xfrm>
+            <a:off x="5825475" y="4238275"/>
+            <a:ext cx="1691700" cy="486525"/>
+          </a:xfrm>
+          <a:prstGeom prst="rect">
+            <a:avLst/>
+          </a:prstGeom>
+          <a:noFill/>
+          <a:ln>
+            <a:noFill/>
+          </a:ln>
+        </p:spPr>
+      </p:pic>
     </p:spTree>
   </p:cSld>
   <p:clrMapOvr>
@@ -7117,7 +8527,15 @@
             </a:pPr>
             <a:r>
               <a:rPr lang="en-US"/>
-              <a:t>Transfer cycles: 12680, running cycles: 1694889</a:t>
+              <a:t>Transfer cycles: 12680, </a:t>
+            </a:r>
+            <a:r>
+              <a:rPr lang="en-US">
+                <a:solidFill>
+                  <a:srgbClr val="FF0000"/>
+                </a:solidFill>
+              </a:rPr>
+              <a:t>running cycles: 1694889</a:t>
             </a:r>
             <a:endParaRPr lang="en-US">
               <a:ln>
@@ -7921,13 +9339,24 @@
             <a:spAutoFit/>
           </a:bodyPr>
           <a:p>
+            <a:pPr marL="285750" indent="-285750">
+              <a:buFont typeface="Arial" panose="020B0604020202090204" pitchFamily="34" charset="0"/>
+              <a:buChar char="•"/>
+            </a:pPr>
+            <a:r>
+              <a:rPr lang="en-US"/>
+              <a:t>When build scripts:</a:t>
+            </a:r>
+            <a:endParaRPr lang="en-US"/>
+          </a:p>
+          <a:p>
             <a:pPr marL="0" indent="0">
               <a:buFont typeface="Arial" panose="020B0604020202090204" pitchFamily="34" charset="0"/>
               <a:buNone/>
             </a:pPr>
             <a:r>
               <a:rPr lang="en-US"/>
-              <a:t>When build scripts:</a:t>
+              <a:t>$(OBJCOPY) --only-keep-debug</a:t>
             </a:r>
             <a:endParaRPr lang="en-US"/>
           </a:p>
@@ -7938,26 +9367,19 @@
             </a:pPr>
             <a:r>
               <a:rPr lang="en-US"/>
-              <a:t>$(OBJCOPY) --only-keep-debug</a:t>
-            </a:r>
-            <a:endParaRPr lang="en-US"/>
-          </a:p>
-          <a:p>
-            <a:pPr marL="0" indent="0">
+              <a:t>Strip everything but the debug information. It will be provided to GDB process.</a:t>
+            </a:r>
+            <a:endParaRPr lang="en-US"/>
+          </a:p>
+          <a:p>
+            <a:pPr marL="285750" indent="-285750">
               <a:buFont typeface="Arial" panose="020B0604020202090204" pitchFamily="34" charset="0"/>
-              <a:buNone/>
+              <a:buChar char="•"/>
             </a:pPr>
             <a:r>
               <a:rPr lang="en-US"/>
-              <a:t>Strip everything but the debug information. It will be provided to GDB process.</a:t>
-            </a:r>
-            <a:endParaRPr lang="en-US"/>
-          </a:p>
-          <a:p>
-            <a:pPr marL="0" indent="0">
-              <a:buFont typeface="Arial" panose="020B0604020202090204" pitchFamily="34" charset="0"/>
-              <a:buNone/>
-            </a:pPr>
+              <a:t>When invoke gdb:</a:t>
+            </a:r>
             <a:endParaRPr lang="en-US"/>
           </a:p>
           <a:p>
@@ -7994,7 +9416,7 @@
         <p:spPr>
           <a:xfrm>
             <a:off x="721995" y="3177540"/>
-            <a:ext cx="6439535" cy="953135"/>
+            <a:ext cx="6439535" cy="1168400"/>
           </a:xfrm>
           <a:prstGeom prst="rect">
             <a:avLst/>
@@ -8013,9 +9435,9 @@
             <a:spAutoFit/>
           </a:bodyPr>
           <a:p>
-            <a:pPr marL="0" indent="0">
+            <a:pPr marL="285750" indent="-285750">
               <a:buFont typeface="Arial" panose="020B0604020202090204" pitchFamily="34" charset="0"/>
-              <a:buNone/>
+              <a:buChar char="•"/>
             </a:pPr>
             <a:r>
               <a:rPr lang="en-US">
@@ -8023,7 +9445,7 @@
                   <a:schemeClr val="bg1"/>
                 </a:solidFill>
               </a:rPr>
-              <a:t>ckb-debugger --listen 127.0.0.1:${PORT} --tx-file sample-data/data1.json  --cell-index 0 --cell-type input --script-group-type lock \</a:t>
+              <a:t>When run scripts:</a:t>
             </a:r>
             <a:endParaRPr lang="en-US">
               <a:solidFill>
@@ -8032,7 +9454,7 @@
             </a:endParaRPr>
           </a:p>
           <a:p>
-            <a:pPr marL="0" algn="l">
+            <a:pPr marL="0" indent="0">
               <a:buFont typeface="Arial" panose="020B0604020202090204" pitchFamily="34" charset="0"/>
               <a:buNone/>
             </a:pPr>
@@ -8042,7 +9464,26 @@
                   <a:schemeClr val="bg1"/>
                 </a:solidFill>
               </a:rPr>
-              <a:t>	--replace-binary </a:t>
+              <a:t>ckb-debugger --mode gdb --gdb-listen 127.0.0.1:${PORT} --tx-file sample-data/data1.json  --cell-index 0 --cell-type input --script-group-type lock \</a:t>
+            </a:r>
+            <a:endParaRPr lang="en-US">
+              <a:solidFill>
+                <a:schemeClr val="bg1"/>
+              </a:solidFill>
+            </a:endParaRPr>
+          </a:p>
+          <a:p>
+            <a:pPr marL="0" algn="l">
+              <a:buFont typeface="Arial" panose="020B0604020202090204" pitchFamily="34" charset="0"/>
+              <a:buNone/>
+            </a:pPr>
+            <a:r>
+              <a:rPr lang="en-US">
+                <a:solidFill>
+                  <a:schemeClr val="bg1"/>
+                </a:solidFill>
+              </a:rPr>
+              <a:t>	--bin </a:t>
             </a:r>
             <a:r>
               <a:rPr lang="en-US">
@@ -8103,7 +9544,7 @@
         </p:nvSpPr>
         <p:spPr>
           <a:xfrm>
-            <a:off x="2923540" y="4261485"/>
+            <a:off x="2929890" y="4476750"/>
             <a:ext cx="5372100" cy="306705"/>
           </a:xfrm>
           <a:prstGeom prst="rect">
@@ -8118,7 +9559,7 @@
           <a:p>
             <a:r>
               <a:rPr lang="en-US"/>
-              <a:t>use --replace-binary to replace RISC-V binary by another one</a:t>
+              <a:t>use --bin to replace RISC-V binary by another one</a:t>
             </a:r>
             <a:endParaRPr lang="en-US"/>
           </a:p>
@@ -8157,8 +9598,8 @@
         </p:nvSpPr>
         <p:spPr>
           <a:xfrm>
-            <a:off x="721995" y="599758"/>
-            <a:ext cx="6812915" cy="430530"/>
+            <a:off x="721995" y="600075"/>
+            <a:ext cx="8063865" cy="430530"/>
           </a:xfrm>
           <a:prstGeom prst="rect">
             <a:avLst/>
@@ -8169,7 +9610,7 @@
           </a:ln>
         </p:spPr>
         <p:txBody>
-          <a:bodyPr spcFirstLastPara="1" wrap="none" lIns="0" tIns="0" rIns="0" bIns="0" anchor="ctr" anchorCtr="0">
+          <a:bodyPr spcFirstLastPara="1" wrap="square" lIns="0" tIns="0" rIns="0" bIns="0" anchor="ctr" anchorCtr="0">
             <a:spAutoFit/>
           </a:bodyPr>
           <a:p>
@@ -8193,7 +9634,7 @@
                 <a:cs typeface="Noto Sans SC Black" panose="020B0A00000000000000" charset="-122"/>
                 <a:sym typeface="Montserrat" panose="00000300000000000000"/>
               </a:rPr>
-              <a:t>More information on --replace-binary</a:t>
+              <a:t>Debug Scripts with Simple Commands</a:t>
             </a:r>
             <a:endParaRPr lang="en-US" sz="2800" kern="100" spc="100">
               <a:solidFill>
@@ -8255,19 +9696,102 @@
       </p:sp>
       <p:sp>
         <p:nvSpPr>
+          <p:cNvPr id="1" name="Text Box 0"/>
+          <p:cNvSpPr txBox="1"/>
+          <p:nvPr/>
+        </p:nvSpPr>
+        <p:spPr>
+          <a:xfrm>
+            <a:off x="721995" y="1318895"/>
+            <a:ext cx="7439025" cy="953135"/>
+          </a:xfrm>
+          <a:prstGeom prst="rect">
+            <a:avLst/>
+          </a:prstGeom>
+        </p:spPr>
+        <p:style>
+          <a:lnRef idx="2">
+            <a:schemeClr val="accent3">
+              <a:shade val="50000"/>
+            </a:schemeClr>
+          </a:lnRef>
+          <a:fillRef idx="1">
+            <a:schemeClr val="accent3"/>
+          </a:fillRef>
+          <a:effectRef idx="0">
+            <a:schemeClr val="accent3"/>
+          </a:effectRef>
+          <a:fontRef idx="minor">
+            <a:schemeClr val="lt1"/>
+          </a:fontRef>
+        </p:style>
+        <p:txBody>
+          <a:bodyPr wrap="square" rtlCol="0">
+            <a:spAutoFit/>
+          </a:bodyPr>
+          <a:p>
+            <a:r>
+              <a:rPr lang="en-US"/>
+              <a:t>❯ make run-debugger</a:t>
+            </a:r>
+            <a:endParaRPr lang="en-US"/>
+          </a:p>
+          <a:p>
+            <a:r>
+              <a:rPr lang="en-US"/>
+              <a:t>ckb-debugger --mode gdb --gdb-listen 127.0.0.1:9999 --tx-file sample-data/data1.json  --cell-index 0 --cell-type input --script-group-type lock \</a:t>
+            </a:r>
+            <a:endParaRPr lang="en-US"/>
+          </a:p>
+          <a:p>
+            <a:r>
+              <a:rPr lang="en-US"/>
+              <a:t>	--bin </a:t>
+            </a:r>
+            <a:r>
+              <a:rPr lang="en-US">
+                <a:solidFill>
+                  <a:srgbClr val="FF0000"/>
+                </a:solidFill>
+              </a:rPr>
+              <a:t>deps/ckb-system-scripts/specs/cells/secp256k1_blake160_sighash_all</a:t>
+            </a:r>
+            <a:endParaRPr lang="en-US">
+              <a:solidFill>
+                <a:srgbClr val="FF0000"/>
+              </a:solidFill>
+            </a:endParaRPr>
+          </a:p>
+        </p:txBody>
+      </p:sp>
+      <p:sp>
+        <p:nvSpPr>
           <p:cNvPr id="2" name="Text Box 1"/>
           <p:cNvSpPr txBox="1"/>
           <p:nvPr/>
         </p:nvSpPr>
         <p:spPr>
           <a:xfrm>
-            <a:off x="977900" y="1565275"/>
-            <a:ext cx="5939155" cy="1814830"/>
-          </a:xfrm>
-          <a:prstGeom prst="rect">
-            <a:avLst/>
-          </a:prstGeom>
-          <a:noFill/>
+            <a:off x="721995" y="2851150"/>
+            <a:ext cx="7409815" cy="1814830"/>
+          </a:xfrm>
+          <a:prstGeom prst="rect">
+            <a:avLst/>
+          </a:prstGeom>
+          <a:solidFill>
+            <a:schemeClr val="accent4">
+              <a:lumMod val="20000"/>
+              <a:lumOff val="80000"/>
+            </a:schemeClr>
+          </a:solidFill>
+          <a:ln>
+            <a:solidFill>
+              <a:schemeClr val="accent4">
+                <a:lumMod val="20000"/>
+                <a:lumOff val="80000"/>
+              </a:schemeClr>
+            </a:solidFill>
+          </a:ln>
         </p:spPr>
         <p:txBody>
           <a:bodyPr wrap="square" rtlCol="0">
@@ -8276,42 +9800,62 @@
           <a:p>
             <a:r>
               <a:rPr lang="en-US"/>
-              <a:t>By default, ckb-debugger only loads and runs the code (RISCV-Binary) listed in mocked transaction file.</a:t>
-            </a:r>
-            <a:endParaRPr lang="en-US"/>
-          </a:p>
-          <a:p>
+              <a:t>❯ make run-docker</a:t>
+            </a:r>
             <a:endParaRPr lang="en-US"/>
           </a:p>
           <a:p>
             <a:r>
               <a:rPr lang="en-US"/>
-              <a:t>The option --replace-binary gives ckb-debugger a chance  to “replace” these code. </a:t>
-            </a:r>
-            <a:endParaRPr lang="en-US"/>
-          </a:p>
-          <a:p>
+              <a:t>docker run --rm -it -v `pwd`:/code nervos/ckb-riscv-gnu-toolchain@sha256:aae8a3f79705f67d505d1f1d5ddc694a4fd537ed1c7e9622420a470d59ba2ec3 bash</a:t>
+            </a:r>
             <a:endParaRPr lang="en-US"/>
           </a:p>
           <a:p>
             <a:r>
               <a:rPr lang="en-US"/>
-              <a:t>We can modify source code, re-build it and use “--replace-binary”  to run new code again.</a:t>
-            </a:r>
-            <a:endParaRPr lang="en-US"/>
-          </a:p>
-        </p:txBody>
-      </p:sp>
-      <p:sp>
-        <p:nvSpPr>
-          <p:cNvPr id="6" name="Text Box 5"/>
+              <a:t>root@60820a2c702e:/# cd code</a:t>
+            </a:r>
+            <a:endParaRPr lang="en-US"/>
+          </a:p>
+          <a:p>
+            <a:r>
+              <a:rPr lang="en-US"/>
+              <a:t>root@60820a2c702e:/code# make run-gdb</a:t>
+            </a:r>
+            <a:endParaRPr lang="en-US"/>
+          </a:p>
+          <a:p>
+            <a:r>
+              <a:rPr lang="en-US"/>
+              <a:t>cd deps/ckb-system-scripts &amp;&amp; riscv64-unknown-linux-gnu-gdb -ex "target remote host.docker.internal:9999" </a:t>
+            </a:r>
+            <a:r>
+              <a:rPr lang="en-US">
+                <a:solidFill>
+                  <a:srgbClr val="FF0000"/>
+                </a:solidFill>
+              </a:rPr>
+              <a:t>build/secp256k1_blake160_sighash_all.debug</a:t>
+            </a:r>
+            <a:endParaRPr lang="en-US">
+              <a:solidFill>
+                <a:srgbClr val="FF0000"/>
+              </a:solidFill>
+            </a:endParaRPr>
+          </a:p>
+        </p:txBody>
+      </p:sp>
+      <p:sp>
+        <p:nvSpPr>
+          <p:cNvPr id="3" name="Text Box 2"/>
           <p:cNvSpPr txBox="1"/>
           <p:nvPr/>
         </p:nvSpPr>
         <p:spPr>
           <a:xfrm>
-            <a:off x="3556635" y="3870325"/>
-            <a:ext cx="3978275" cy="306705"/>
+            <a:off x="4867910" y="2560320"/>
+            <a:ext cx="3188335" cy="245110"/>
           </a:xfrm>
           <a:prstGeom prst="rect">
             <a:avLst/>
@@ -8321,41 +9865,13 @@
         <p:txBody>
           <a:bodyPr wrap="square" rtlCol="0">
             <a:spAutoFit/>
-            <a:scene3d>
-              <a:camera prst="orthographicFront"/>
-              <a:lightRig rig="threePt" dir="t"/>
-            </a:scene3d>
           </a:bodyPr>
           <a:p>
             <a:r>
-              <a:rPr lang="en-US">
-                <a:ln/>
-                <a:solidFill>
-                  <a:schemeClr val="tx1"/>
-                </a:solidFill>
-                <a:effectLst>
-                  <a:outerShdw blurRad="38100" dist="19050" dir="2700000" algn="tl" rotWithShape="0">
-                    <a:schemeClr val="dk1">
-                      <a:alpha val="40000"/>
-                    </a:schemeClr>
-                  </a:outerShdw>
-                </a:effectLst>
-              </a:rPr>
-              <a:t>--simple-binary is an aliace of --replace-binary</a:t>
-            </a:r>
-            <a:endParaRPr lang="en-US">
-              <a:ln/>
-              <a:solidFill>
-                <a:schemeClr val="tx1"/>
-              </a:solidFill>
-              <a:effectLst>
-                <a:outerShdw blurRad="38100" dist="19050" dir="2700000" algn="tl" rotWithShape="0">
-                  <a:schemeClr val="dk1">
-                    <a:alpha val="40000"/>
-                  </a:schemeClr>
-                </a:outerShdw>
-              </a:effectLst>
-            </a:endParaRPr>
+              <a:rPr lang="en-US" sz="1000"/>
+              <a:t>Use GNU toolchain for RISC-V in docker</a:t>
+            </a:r>
+            <a:endParaRPr lang="en-US" sz="1000"/>
           </a:p>
         </p:txBody>
       </p:sp>
@@ -8933,4 +10449,263 @@
     </a:ext>
   </a:extLst>
 </a:theme>
+</file>
+
+<file path=ppt/theme/theme3.xml><?xml version="1.0" encoding="utf-8"?>
+<a:theme xmlns:a="http://schemas.openxmlformats.org/drawingml/2006/main" name="Office Theme">
+  <a:themeElements>
+    <a:clrScheme name="Office">
+      <a:dk1>
+        <a:sysClr val="windowText" lastClr="000000"/>
+      </a:dk1>
+      <a:lt1>
+        <a:sysClr val="window" lastClr="FFFFFF"/>
+      </a:lt1>
+      <a:dk2>
+        <a:srgbClr val="44546A"/>
+      </a:dk2>
+      <a:lt2>
+        <a:srgbClr val="E7E6E6"/>
+      </a:lt2>
+      <a:accent1>
+        <a:srgbClr val="5B9BD5"/>
+      </a:accent1>
+      <a:accent2>
+        <a:srgbClr val="ED7D31"/>
+      </a:accent2>
+      <a:accent3>
+        <a:srgbClr val="A5A5A5"/>
+      </a:accent3>
+      <a:accent4>
+        <a:srgbClr val="FFC000"/>
+      </a:accent4>
+      <a:accent5>
+        <a:srgbClr val="4472C4"/>
+      </a:accent5>
+      <a:accent6>
+        <a:srgbClr val="70AD47"/>
+      </a:accent6>
+      <a:hlink>
+        <a:srgbClr val="0563C1"/>
+      </a:hlink>
+      <a:folHlink>
+        <a:srgbClr val="954F72"/>
+      </a:folHlink>
+    </a:clrScheme>
+    <a:fontScheme name="Office">
+      <a:majorFont>
+        <a:latin typeface="Calibri Light"/>
+        <a:ea typeface=""/>
+        <a:cs typeface=""/>
+        <a:font script="Jpan" typeface="ＭＳ Ｐゴシック"/>
+        <a:font script="Hang" typeface="맑은 고딕"/>
+        <a:font script="Hans" typeface="宋体"/>
+        <a:font script="Hant" typeface="新細明體"/>
+        <a:font script="Arab" typeface="Times New Roman"/>
+        <a:font script="Hebr" typeface="Times New Roman"/>
+        <a:font script="Thai" typeface="Angsana New"/>
+        <a:font script="Ethi" typeface="Nyala"/>
+        <a:font script="Beng" typeface="Vrinda"/>
+        <a:font script="Gujr" typeface="Shruti"/>
+        <a:font script="Khmr" typeface="MoolBoran"/>
+        <a:font script="Knda" typeface="Tunga"/>
+        <a:font script="Guru" typeface="Raavi"/>
+        <a:font script="Cans" typeface="Euphemia"/>
+        <a:font script="Cher" typeface="Plantagenet Cherokee"/>
+        <a:font script="Yiii" typeface="Microsoft Yi Baiti"/>
+        <a:font script="Tibt" typeface="Microsoft Himalaya"/>
+        <a:font script="Thaa" typeface="MV Boli"/>
+        <a:font script="Deva" typeface="Mangal"/>
+        <a:font script="Telu" typeface="Gautami"/>
+        <a:font script="Taml" typeface="Latha"/>
+        <a:font script="Syrc" typeface="Estrangelo Edessa"/>
+        <a:font script="Orya" typeface="Kalinga"/>
+        <a:font script="Mlym" typeface="Kartika"/>
+        <a:font script="Laoo" typeface="DokChampa"/>
+        <a:font script="Sinh" typeface="Iskoola Pota"/>
+        <a:font script="Mong" typeface="Mongolian Baiti"/>
+        <a:font script="Viet" typeface="Times New Roman"/>
+        <a:font script="Uigh" typeface="Microsoft Uighur"/>
+        <a:font script="Geor" typeface="Sylfaen"/>
+      </a:majorFont>
+      <a:minorFont>
+        <a:latin typeface="Calibri"/>
+        <a:ea typeface=""/>
+        <a:cs typeface=""/>
+        <a:font script="Jpan" typeface="ＭＳ Ｐゴシック"/>
+        <a:font script="Hang" typeface="맑은 고딕"/>
+        <a:font script="Hans" typeface="宋体"/>
+        <a:font script="Hant" typeface="新細明體"/>
+        <a:font script="Arab" typeface="Arial"/>
+        <a:font script="Hebr" typeface="Arial"/>
+        <a:font script="Thai" typeface="Cordia New"/>
+        <a:font script="Ethi" typeface="Nyala"/>
+        <a:font script="Beng" typeface="Vrinda"/>
+        <a:font script="Gujr" typeface="Shruti"/>
+        <a:font script="Khmr" typeface="DaunPenh"/>
+        <a:font script="Knda" typeface="Tunga"/>
+        <a:font script="Guru" typeface="Raavi"/>
+        <a:font script="Cans" typeface="Euphemia"/>
+        <a:font script="Cher" typeface="Plantagenet Cherokee"/>
+        <a:font script="Yiii" typeface="Microsoft Yi Baiti"/>
+        <a:font script="Tibt" typeface="Microsoft Himalaya"/>
+        <a:font script="Thaa" typeface="MV Boli"/>
+        <a:font script="Deva" typeface="Mangal"/>
+        <a:font script="Telu" typeface="Gautami"/>
+        <a:font script="Taml" typeface="Latha"/>
+        <a:font script="Syrc" typeface="Estrangelo Edessa"/>
+        <a:font script="Orya" typeface="Kalinga"/>
+        <a:font script="Mlym" typeface="Kartika"/>
+        <a:font script="Laoo" typeface="DokChampa"/>
+        <a:font script="Sinh" typeface="Iskoola Pota"/>
+        <a:font script="Mong" typeface="Mongolian Baiti"/>
+        <a:font script="Viet" typeface="Arial"/>
+        <a:font script="Uigh" typeface="Microsoft Uighur"/>
+        <a:font script="Geor" typeface="Sylfaen"/>
+      </a:minorFont>
+    </a:fontScheme>
+    <a:fmtScheme name="Office">
+      <a:fillStyleLst>
+        <a:solidFill>
+          <a:schemeClr val="phClr"/>
+        </a:solidFill>
+        <a:gradFill rotWithShape="1">
+          <a:gsLst>
+            <a:gs pos="0">
+              <a:schemeClr val="phClr">
+                <a:lumMod val="110000"/>
+                <a:satMod val="105000"/>
+                <a:tint val="67000"/>
+              </a:schemeClr>
+            </a:gs>
+            <a:gs pos="50000">
+              <a:schemeClr val="phClr">
+                <a:lumMod val="105000"/>
+                <a:satMod val="103000"/>
+                <a:tint val="73000"/>
+              </a:schemeClr>
+            </a:gs>
+            <a:gs pos="100000">
+              <a:schemeClr val="phClr">
+                <a:lumMod val="105000"/>
+                <a:satMod val="109000"/>
+                <a:tint val="81000"/>
+              </a:schemeClr>
+            </a:gs>
+          </a:gsLst>
+          <a:lin ang="5400000" scaled="0"/>
+        </a:gradFill>
+        <a:gradFill rotWithShape="1">
+          <a:gsLst>
+            <a:gs pos="0">
+              <a:schemeClr val="phClr">
+                <a:satMod val="103000"/>
+                <a:lumMod val="102000"/>
+                <a:tint val="94000"/>
+              </a:schemeClr>
+            </a:gs>
+            <a:gs pos="50000">
+              <a:schemeClr val="phClr">
+                <a:satMod val="110000"/>
+                <a:lumMod val="100000"/>
+                <a:shade val="100000"/>
+              </a:schemeClr>
+            </a:gs>
+            <a:gs pos="100000">
+              <a:schemeClr val="phClr">
+                <a:lumMod val="99000"/>
+                <a:satMod val="120000"/>
+                <a:shade val="78000"/>
+              </a:schemeClr>
+            </a:gs>
+          </a:gsLst>
+          <a:lin ang="5400000" scaled="0"/>
+        </a:gradFill>
+      </a:fillStyleLst>
+      <a:lnStyleLst>
+        <a:ln w="6350" cap="flat" cmpd="sng" algn="ctr">
+          <a:solidFill>
+            <a:schemeClr val="phClr"/>
+          </a:solidFill>
+          <a:prstDash val="solid"/>
+          <a:miter lim="800000"/>
+        </a:ln>
+        <a:ln w="12700" cap="flat" cmpd="sng" algn="ctr">
+          <a:solidFill>
+            <a:schemeClr val="phClr"/>
+          </a:solidFill>
+          <a:prstDash val="solid"/>
+          <a:miter lim="800000"/>
+        </a:ln>
+        <a:ln w="19050" cap="flat" cmpd="sng" algn="ctr">
+          <a:solidFill>
+            <a:schemeClr val="phClr"/>
+          </a:solidFill>
+          <a:prstDash val="solid"/>
+          <a:miter lim="800000"/>
+        </a:ln>
+      </a:lnStyleLst>
+      <a:effectStyleLst>
+        <a:effectStyle>
+          <a:effectLst/>
+        </a:effectStyle>
+        <a:effectStyle>
+          <a:effectLst/>
+        </a:effectStyle>
+        <a:effectStyle>
+          <a:effectLst>
+            <a:outerShdw blurRad="57150" dist="19050" dir="5400000" algn="ctr" rotWithShape="0">
+              <a:srgbClr val="000000">
+                <a:alpha val="63000"/>
+              </a:srgbClr>
+            </a:outerShdw>
+          </a:effectLst>
+        </a:effectStyle>
+      </a:effectStyleLst>
+      <a:bgFillStyleLst>
+        <a:solidFill>
+          <a:schemeClr val="phClr"/>
+        </a:solidFill>
+        <a:solidFill>
+          <a:schemeClr val="phClr">
+            <a:tint val="95000"/>
+            <a:satMod val="170000"/>
+          </a:schemeClr>
+        </a:solidFill>
+        <a:gradFill rotWithShape="1">
+          <a:gsLst>
+            <a:gs pos="0">
+              <a:schemeClr val="phClr">
+                <a:tint val="93000"/>
+                <a:satMod val="150000"/>
+                <a:shade val="98000"/>
+                <a:lumMod val="102000"/>
+              </a:schemeClr>
+            </a:gs>
+            <a:gs pos="50000">
+              <a:schemeClr val="phClr">
+                <a:tint val="98000"/>
+                <a:satMod val="130000"/>
+                <a:shade val="90000"/>
+                <a:lumMod val="103000"/>
+              </a:schemeClr>
+            </a:gs>
+            <a:gs pos="100000">
+              <a:schemeClr val="phClr">
+                <a:shade val="63000"/>
+                <a:satMod val="120000"/>
+              </a:schemeClr>
+            </a:gs>
+          </a:gsLst>
+          <a:lin ang="5400000" scaled="0"/>
+        </a:gradFill>
+      </a:bgFillStyleLst>
+    </a:fmtScheme>
+  </a:themeElements>
+  <a:extLst>
+    <a:ext uri="{05A4C25C-085E-4340-85A3-A5531E510DB2}">
+      <thm15:themeFamily xmlns:thm15="http://schemas.microsoft.com/office/thememl/2012/main" name="Office Theme" id="{62F939B6-93AF-4DB8-9C6B-D6C7DFDC589F}" vid="{4A3C46E8-61CC-4603-A589-7422A47A8E4A}"/>
+    </a:ext>
+  </a:extLst>
+</a:theme>
 </file>
</xml_diff>